<commit_message>
update fig 1,2,3: variables's font
</commit_message>
<xml_diff>
--- a/paper/fig/fig.pptx
+++ b/paper/fig/fig.pptx
@@ -196,7 +196,7 @@
           </a:lstStyle>
           <a:p>
             <a:fld id="{E0E086A6-DBA7-9D4A-A449-B96BF57AEBBA}" type="datetimeFigureOut">
-              <a:t>11/27/19</a:t>
+              <a:t>12/3/19</a:t>
             </a:fld>
             <a:endParaRPr lang="en-US"/>
           </a:p>
@@ -691,7 +691,7 @@
           <a:lstStyle/>
           <a:p>
             <a:fld id="{B6D07838-E7F1-BD4D-957D-BBB2EE24697C}" type="datetimeFigureOut">
-              <a:t>11/27/19</a:t>
+              <a:t>12/3/19</a:t>
             </a:fld>
             <a:endParaRPr lang="en-US"/>
           </a:p>
@@ -887,7 +887,7 @@
           <a:lstStyle/>
           <a:p>
             <a:fld id="{B6D07838-E7F1-BD4D-957D-BBB2EE24697C}" type="datetimeFigureOut">
-              <a:t>11/27/19</a:t>
+              <a:t>12/3/19</a:t>
             </a:fld>
             <a:endParaRPr lang="en-US"/>
           </a:p>
@@ -1093,7 +1093,7 @@
           <a:lstStyle/>
           <a:p>
             <a:fld id="{B6D07838-E7F1-BD4D-957D-BBB2EE24697C}" type="datetimeFigureOut">
-              <a:t>11/27/19</a:t>
+              <a:t>12/3/19</a:t>
             </a:fld>
             <a:endParaRPr lang="en-US"/>
           </a:p>
@@ -1289,7 +1289,7 @@
           <a:lstStyle/>
           <a:p>
             <a:fld id="{B6D07838-E7F1-BD4D-957D-BBB2EE24697C}" type="datetimeFigureOut">
-              <a:t>11/27/19</a:t>
+              <a:t>12/3/19</a:t>
             </a:fld>
             <a:endParaRPr lang="en-US"/>
           </a:p>
@@ -1562,7 +1562,7 @@
           <a:lstStyle/>
           <a:p>
             <a:fld id="{B6D07838-E7F1-BD4D-957D-BBB2EE24697C}" type="datetimeFigureOut">
-              <a:t>11/27/19</a:t>
+              <a:t>12/3/19</a:t>
             </a:fld>
             <a:endParaRPr lang="en-US"/>
           </a:p>
@@ -1825,7 +1825,7 @@
           <a:lstStyle/>
           <a:p>
             <a:fld id="{B6D07838-E7F1-BD4D-957D-BBB2EE24697C}" type="datetimeFigureOut">
-              <a:t>11/27/19</a:t>
+              <a:t>12/3/19</a:t>
             </a:fld>
             <a:endParaRPr lang="en-US"/>
           </a:p>
@@ -2235,7 +2235,7 @@
           <a:lstStyle/>
           <a:p>
             <a:fld id="{B6D07838-E7F1-BD4D-957D-BBB2EE24697C}" type="datetimeFigureOut">
-              <a:t>11/27/19</a:t>
+              <a:t>12/3/19</a:t>
             </a:fld>
             <a:endParaRPr lang="en-US"/>
           </a:p>
@@ -2374,7 +2374,7 @@
           <a:lstStyle/>
           <a:p>
             <a:fld id="{B6D07838-E7F1-BD4D-957D-BBB2EE24697C}" type="datetimeFigureOut">
-              <a:t>11/27/19</a:t>
+              <a:t>12/3/19</a:t>
             </a:fld>
             <a:endParaRPr lang="en-US"/>
           </a:p>
@@ -2485,7 +2485,7 @@
           <a:lstStyle/>
           <a:p>
             <a:fld id="{B6D07838-E7F1-BD4D-957D-BBB2EE24697C}" type="datetimeFigureOut">
-              <a:t>11/27/19</a:t>
+              <a:t>12/3/19</a:t>
             </a:fld>
             <a:endParaRPr lang="en-US"/>
           </a:p>
@@ -2794,7 +2794,7 @@
           <a:lstStyle/>
           <a:p>
             <a:fld id="{B6D07838-E7F1-BD4D-957D-BBB2EE24697C}" type="datetimeFigureOut">
-              <a:t>11/27/19</a:t>
+              <a:t>12/3/19</a:t>
             </a:fld>
             <a:endParaRPr lang="en-US"/>
           </a:p>
@@ -3080,7 +3080,7 @@
           <a:lstStyle/>
           <a:p>
             <a:fld id="{B6D07838-E7F1-BD4D-957D-BBB2EE24697C}" type="datetimeFigureOut">
-              <a:t>11/27/19</a:t>
+              <a:t>12/3/19</a:t>
             </a:fld>
             <a:endParaRPr lang="en-US"/>
           </a:p>
@@ -3319,7 +3319,7 @@
           </a:lstStyle>
           <a:p>
             <a:fld id="{B6D07838-E7F1-BD4D-957D-BBB2EE24697C}" type="datetimeFigureOut">
-              <a:t>11/27/19</a:t>
+              <a:t>12/3/19</a:t>
             </a:fld>
             <a:endParaRPr lang="en-US"/>
           </a:p>
@@ -3737,10 +3737,10 @@
       </p:grpSpPr>
       <p:grpSp>
         <p:nvGrpSpPr>
-          <p:cNvPr id="272" name="Group 271">
+          <p:cNvPr id="33" name="Group 32">
             <a:extLst>
               <a:ext uri="{FF2B5EF4-FFF2-40B4-BE49-F238E27FC236}">
-                <a16:creationId xmlns:a16="http://schemas.microsoft.com/office/drawing/2014/main" id="{19AEE8FA-5C62-8243-9F6B-DEB6976F2A9E}"/>
+                <a16:creationId xmlns:a16="http://schemas.microsoft.com/office/drawing/2014/main" id="{A22D2C77-680A-1B49-B55A-F126747F68BC}"/>
               </a:ext>
             </a:extLst>
           </p:cNvPr>
@@ -3749,10 +3749,10 @@
         </p:nvGrpSpPr>
         <p:grpSpPr>
           <a:xfrm>
-            <a:off x="1698098" y="315524"/>
-            <a:ext cx="2271719" cy="2258717"/>
-            <a:chOff x="3293462" y="272455"/>
-            <a:chExt cx="2271719" cy="2258717"/>
+            <a:off x="1679564" y="315524"/>
+            <a:ext cx="2327122" cy="2258717"/>
+            <a:chOff x="1679564" y="315524"/>
+            <a:chExt cx="2327122" cy="2258717"/>
           </a:xfrm>
         </p:grpSpPr>
         <p:sp>
@@ -3769,7 +3769,7 @@
           </p:nvSpPr>
           <p:spPr>
             <a:xfrm>
-              <a:off x="3420779" y="642662"/>
+              <a:off x="1825415" y="685731"/>
               <a:ext cx="431515" cy="431515"/>
             </a:xfrm>
             <a:prstGeom prst="ellipse">
@@ -3813,58 +3813,19 @@
         </p:sp>
         <p:sp>
           <p:nvSpPr>
-            <p:cNvPr id="47" name="TextBox 46">
-              <a:extLst>
-                <a:ext uri="{FF2B5EF4-FFF2-40B4-BE49-F238E27FC236}">
-                  <a16:creationId xmlns:a16="http://schemas.microsoft.com/office/drawing/2014/main" id="{F8ABB8F7-AF64-E64E-9C5B-18E93CE8CC78}"/>
-                </a:ext>
-              </a:extLst>
-            </p:cNvPr>
-            <p:cNvSpPr txBox="1"/>
+            <p:cNvPr id="48" name="Oval 47">
+              <a:extLst>
+                <a:ext uri="{FF2B5EF4-FFF2-40B4-BE49-F238E27FC236}">
+                  <a16:creationId xmlns:a16="http://schemas.microsoft.com/office/drawing/2014/main" id="{C579FCCB-D6E3-054E-966D-CBD9ED232EAB}"/>
+                </a:ext>
+              </a:extLst>
+            </p:cNvPr>
+            <p:cNvSpPr/>
             <p:nvPr/>
           </p:nvSpPr>
           <p:spPr>
             <a:xfrm>
-              <a:off x="3501762" y="637776"/>
-              <a:ext cx="285656" cy="400110"/>
-            </a:xfrm>
-            <a:prstGeom prst="rect">
-              <a:avLst/>
-            </a:prstGeom>
-            <a:noFill/>
-          </p:spPr>
-          <p:txBody>
-            <a:bodyPr wrap="none" rtlCol="0">
-              <a:spAutoFit/>
-            </a:bodyPr>
-            <a:lstStyle/>
-            <a:p>
-              <a:r>
-                <a:rPr lang="en-US" sz="2000" b="1">
-                  <a:latin typeface="CMU Serif Roman" panose="02000603000000000000" pitchFamily="2" charset="0"/>
-                  <a:ea typeface="CMU Serif Roman" panose="02000603000000000000" pitchFamily="2" charset="0"/>
-                  <a:cs typeface="CMU Serif Roman" panose="02000603000000000000" pitchFamily="2" charset="0"/>
-                </a:rPr>
-                <a:t>s</a:t>
-              </a:r>
-            </a:p>
-          </p:txBody>
-        </p:sp>
-        <p:sp>
-          <p:nvSpPr>
-            <p:cNvPr id="48" name="Oval 47">
-              <a:extLst>
-                <a:ext uri="{FF2B5EF4-FFF2-40B4-BE49-F238E27FC236}">
-                  <a16:creationId xmlns:a16="http://schemas.microsoft.com/office/drawing/2014/main" id="{C579FCCB-D6E3-054E-966D-CBD9ED232EAB}"/>
-                </a:ext>
-              </a:extLst>
-            </p:cNvPr>
-            <p:cNvSpPr/>
-            <p:nvPr/>
-          </p:nvSpPr>
-          <p:spPr>
-            <a:xfrm>
-              <a:off x="4760713" y="642662"/>
+              <a:off x="3165349" y="685731"/>
               <a:ext cx="431515" cy="431515"/>
             </a:xfrm>
             <a:prstGeom prst="ellipse">
@@ -3908,58 +3869,19 @@
         </p:sp>
         <p:sp>
           <p:nvSpPr>
-            <p:cNvPr id="49" name="TextBox 48">
-              <a:extLst>
-                <a:ext uri="{FF2B5EF4-FFF2-40B4-BE49-F238E27FC236}">
-                  <a16:creationId xmlns:a16="http://schemas.microsoft.com/office/drawing/2014/main" id="{E5792DC4-4538-0740-A47B-E550430973CB}"/>
-                </a:ext>
-              </a:extLst>
-            </p:cNvPr>
-            <p:cNvSpPr txBox="1"/>
+            <p:cNvPr id="50" name="Oval 49">
+              <a:extLst>
+                <a:ext uri="{FF2B5EF4-FFF2-40B4-BE49-F238E27FC236}">
+                  <a16:creationId xmlns:a16="http://schemas.microsoft.com/office/drawing/2014/main" id="{200C9B36-6675-374F-B3B1-55ED5D10DBE8}"/>
+                </a:ext>
+              </a:extLst>
+            </p:cNvPr>
+            <p:cNvSpPr/>
             <p:nvPr/>
           </p:nvSpPr>
           <p:spPr>
             <a:xfrm>
-              <a:off x="4820498" y="637776"/>
-              <a:ext cx="319318" cy="400110"/>
-            </a:xfrm>
-            <a:prstGeom prst="rect">
-              <a:avLst/>
-            </a:prstGeom>
-            <a:noFill/>
-          </p:spPr>
-          <p:txBody>
-            <a:bodyPr wrap="none" rtlCol="0">
-              <a:spAutoFit/>
-            </a:bodyPr>
-            <a:lstStyle/>
-            <a:p>
-              <a:r>
-                <a:rPr lang="en-US" sz="2000" b="1">
-                  <a:latin typeface="CMU Serif Roman" panose="02000603000000000000" pitchFamily="2" charset="0"/>
-                  <a:ea typeface="CMU Serif Roman" panose="02000603000000000000" pitchFamily="2" charset="0"/>
-                  <a:cs typeface="CMU Serif Roman" panose="02000603000000000000" pitchFamily="2" charset="0"/>
-                </a:rPr>
-                <a:t>v</a:t>
-              </a:r>
-            </a:p>
-          </p:txBody>
-        </p:sp>
-        <p:sp>
-          <p:nvSpPr>
-            <p:cNvPr id="50" name="Oval 49">
-              <a:extLst>
-                <a:ext uri="{FF2B5EF4-FFF2-40B4-BE49-F238E27FC236}">
-                  <a16:creationId xmlns:a16="http://schemas.microsoft.com/office/drawing/2014/main" id="{200C9B36-6675-374F-B3B1-55ED5D10DBE8}"/>
-                </a:ext>
-              </a:extLst>
-            </p:cNvPr>
-            <p:cNvSpPr/>
-            <p:nvPr/>
-          </p:nvSpPr>
-          <p:spPr>
-            <a:xfrm>
-              <a:off x="3428833" y="1719736"/>
+              <a:off x="1833469" y="1762805"/>
               <a:ext cx="431515" cy="431515"/>
             </a:xfrm>
             <a:prstGeom prst="ellipse">
@@ -4003,58 +3925,19 @@
         </p:sp>
         <p:sp>
           <p:nvSpPr>
-            <p:cNvPr id="51" name="TextBox 50">
-              <a:extLst>
-                <a:ext uri="{FF2B5EF4-FFF2-40B4-BE49-F238E27FC236}">
-                  <a16:creationId xmlns:a16="http://schemas.microsoft.com/office/drawing/2014/main" id="{DE10729E-9AA0-ED4F-BE09-ECED7593CEDD}"/>
-                </a:ext>
-              </a:extLst>
-            </p:cNvPr>
-            <p:cNvSpPr txBox="1"/>
+            <p:cNvPr id="52" name="Oval 51">
+              <a:extLst>
+                <a:ext uri="{FF2B5EF4-FFF2-40B4-BE49-F238E27FC236}">
+                  <a16:creationId xmlns:a16="http://schemas.microsoft.com/office/drawing/2014/main" id="{20E39971-8CE4-034D-8FE5-3D16C2A8FFAC}"/>
+                </a:ext>
+              </a:extLst>
+            </p:cNvPr>
+            <p:cNvSpPr/>
             <p:nvPr/>
           </p:nvSpPr>
           <p:spPr>
             <a:xfrm>
-              <a:off x="3492403" y="1726565"/>
-              <a:ext cx="354584" cy="400110"/>
-            </a:xfrm>
-            <a:prstGeom prst="rect">
-              <a:avLst/>
-            </a:prstGeom>
-            <a:noFill/>
-          </p:spPr>
-          <p:txBody>
-            <a:bodyPr wrap="none" rtlCol="0">
-              <a:spAutoFit/>
-            </a:bodyPr>
-            <a:lstStyle/>
-            <a:p>
-              <a:r>
-                <a:rPr lang="en-US" sz="2000" b="1">
-                  <a:latin typeface="CMU Serif Roman" panose="02000603000000000000" pitchFamily="2" charset="0"/>
-                  <a:ea typeface="CMU Serif Roman" panose="02000603000000000000" pitchFamily="2" charset="0"/>
-                  <a:cs typeface="CMU Serif Roman" panose="02000603000000000000" pitchFamily="2" charset="0"/>
-                </a:rPr>
-                <a:t>s’</a:t>
-              </a:r>
-            </a:p>
-          </p:txBody>
-        </p:sp>
-        <p:sp>
-          <p:nvSpPr>
-            <p:cNvPr id="52" name="Oval 51">
-              <a:extLst>
-                <a:ext uri="{FF2B5EF4-FFF2-40B4-BE49-F238E27FC236}">
-                  <a16:creationId xmlns:a16="http://schemas.microsoft.com/office/drawing/2014/main" id="{20E39971-8CE4-034D-8FE5-3D16C2A8FFAC}"/>
-                </a:ext>
-              </a:extLst>
-            </p:cNvPr>
-            <p:cNvSpPr/>
-            <p:nvPr/>
-          </p:nvSpPr>
-          <p:spPr>
-            <a:xfrm>
-              <a:off x="4760713" y="1719736"/>
+              <a:off x="3165349" y="1762805"/>
               <a:ext cx="431515" cy="431515"/>
             </a:xfrm>
             <a:prstGeom prst="ellipse">
@@ -4098,58 +3981,19 @@
         </p:sp>
         <p:sp>
           <p:nvSpPr>
-            <p:cNvPr id="53" name="TextBox 52">
-              <a:extLst>
-                <a:ext uri="{FF2B5EF4-FFF2-40B4-BE49-F238E27FC236}">
-                  <a16:creationId xmlns:a16="http://schemas.microsoft.com/office/drawing/2014/main" id="{7E737024-2184-B34E-9DF5-549BB8020382}"/>
-                </a:ext>
-              </a:extLst>
-            </p:cNvPr>
-            <p:cNvSpPr txBox="1"/>
+            <p:cNvPr id="54" name="Triangle 53">
+              <a:extLst>
+                <a:ext uri="{FF2B5EF4-FFF2-40B4-BE49-F238E27FC236}">
+                  <a16:creationId xmlns:a16="http://schemas.microsoft.com/office/drawing/2014/main" id="{CD4882C9-B97A-D74C-94C6-7151E3AC9188}"/>
+                </a:ext>
+              </a:extLst>
+            </p:cNvPr>
+            <p:cNvSpPr/>
             <p:nvPr/>
           </p:nvSpPr>
           <p:spPr>
-            <a:xfrm>
-              <a:off x="4818531" y="1729606"/>
-              <a:ext cx="391454" cy="400110"/>
-            </a:xfrm>
-            <a:prstGeom prst="rect">
-              <a:avLst/>
-            </a:prstGeom>
-            <a:noFill/>
-          </p:spPr>
-          <p:txBody>
-            <a:bodyPr wrap="none" rtlCol="0">
-              <a:spAutoFit/>
-            </a:bodyPr>
-            <a:lstStyle/>
-            <a:p>
-              <a:r>
-                <a:rPr lang="en-US" sz="2000" b="1">
-                  <a:latin typeface="CMU Serif Roman" panose="02000603000000000000" pitchFamily="2" charset="0"/>
-                  <a:ea typeface="CMU Serif Roman" panose="02000603000000000000" pitchFamily="2" charset="0"/>
-                  <a:cs typeface="CMU Serif Roman" panose="02000603000000000000" pitchFamily="2" charset="0"/>
-                </a:rPr>
-                <a:t>v’</a:t>
-              </a:r>
-            </a:p>
-          </p:txBody>
-        </p:sp>
-        <p:sp>
-          <p:nvSpPr>
-            <p:cNvPr id="54" name="Triangle 53">
-              <a:extLst>
-                <a:ext uri="{FF2B5EF4-FFF2-40B4-BE49-F238E27FC236}">
-                  <a16:creationId xmlns:a16="http://schemas.microsoft.com/office/drawing/2014/main" id="{CD4882C9-B97A-D74C-94C6-7151E3AC9188}"/>
-                </a:ext>
-              </a:extLst>
-            </p:cNvPr>
-            <p:cNvSpPr/>
-            <p:nvPr/>
-          </p:nvSpPr>
-          <p:spPr>
             <a:xfrm rot="5400000">
-              <a:off x="4254717" y="794049"/>
+              <a:off x="2659353" y="837118"/>
               <a:ext cx="166756" cy="143755"/>
             </a:xfrm>
             <a:prstGeom prst="triangle">
@@ -4207,7 +4051,7 @@
           </p:nvCxnSpPr>
           <p:spPr>
             <a:xfrm>
-              <a:off x="3860348" y="857002"/>
+              <a:off x="2264984" y="900071"/>
               <a:ext cx="900365" cy="0"/>
             </a:xfrm>
             <a:prstGeom prst="line">
@@ -4248,7 +4092,7 @@
           </p:nvSpPr>
           <p:spPr>
             <a:xfrm rot="16200000">
-              <a:off x="4190240" y="1875849"/>
+              <a:off x="2594876" y="1918918"/>
               <a:ext cx="166756" cy="143755"/>
             </a:xfrm>
             <a:prstGeom prst="triangle">
@@ -4308,7 +4152,7 @@
           </p:nvCxnSpPr>
           <p:spPr>
             <a:xfrm>
-              <a:off x="3860348" y="1935494"/>
+              <a:off x="2264984" y="1978563"/>
               <a:ext cx="900365" cy="0"/>
             </a:xfrm>
             <a:prstGeom prst="line">
@@ -4349,7 +4193,7 @@
           </p:nvSpPr>
           <p:spPr>
             <a:xfrm>
-              <a:off x="3852374" y="859820"/>
+              <a:off x="2257010" y="902889"/>
               <a:ext cx="691464" cy="1066800"/>
             </a:xfrm>
             <a:custGeom>
@@ -4443,7 +4287,7 @@
           </p:nvSpPr>
           <p:spPr>
             <a:xfrm>
-              <a:off x="4114979" y="492133"/>
+              <a:off x="2519615" y="535202"/>
               <a:ext cx="423514" cy="307777"/>
             </a:xfrm>
             <a:prstGeom prst="rect">
@@ -4482,7 +4326,7 @@
           </p:nvSpPr>
           <p:spPr>
             <a:xfrm>
-              <a:off x="4091209" y="1968930"/>
+              <a:off x="2495845" y="2011999"/>
               <a:ext cx="452368" cy="307777"/>
             </a:xfrm>
             <a:prstGeom prst="rect">
@@ -4521,8 +4365,8 @@
           </p:nvSpPr>
           <p:spPr>
             <a:xfrm>
-              <a:off x="3396608" y="272455"/>
-              <a:ext cx="516488" cy="307777"/>
+              <a:off x="1782710" y="315524"/>
+              <a:ext cx="572593" cy="307777"/>
             </a:xfrm>
             <a:prstGeom prst="rect">
               <a:avLst/>
@@ -4541,7 +4385,7 @@
                   <a:ea typeface="CMU Serif Roman" panose="02000603000000000000" pitchFamily="2" charset="0"/>
                   <a:cs typeface="CMU Serif Roman" panose="02000603000000000000" pitchFamily="2" charset="0"/>
                 </a:rPr>
-                <a:t>[1,2]</a:t>
+                <a:t>[1, 2]</a:t>
               </a:r>
             </a:p>
           </p:txBody>
@@ -4560,7 +4404,7 @@
           </p:nvSpPr>
           <p:spPr>
             <a:xfrm>
-              <a:off x="4850481" y="278200"/>
+              <a:off x="3255117" y="321269"/>
               <a:ext cx="274434" cy="307777"/>
             </a:xfrm>
             <a:prstGeom prst="rect">
@@ -4599,7 +4443,7 @@
           </p:nvSpPr>
           <p:spPr>
             <a:xfrm>
-              <a:off x="4760713" y="2223395"/>
+              <a:off x="3165349" y="2266464"/>
               <a:ext cx="453970" cy="307777"/>
             </a:xfrm>
             <a:prstGeom prst="rect">
@@ -4638,8 +4482,8 @@
           </p:nvSpPr>
           <p:spPr>
             <a:xfrm>
-              <a:off x="3293462" y="2223394"/>
-              <a:ext cx="696024" cy="307777"/>
+              <a:off x="1679564" y="2266463"/>
+              <a:ext cx="752129" cy="307777"/>
             </a:xfrm>
             <a:prstGeom prst="rect">
               <a:avLst/>
@@ -4658,7 +4502,7 @@
                   <a:ea typeface="CMU Serif Roman" panose="02000603000000000000" pitchFamily="2" charset="0"/>
                   <a:cs typeface="CMU Serif Roman" panose="02000603000000000000" pitchFamily="2" charset="0"/>
                 </a:rPr>
-                <a:t>[100,2]</a:t>
+                <a:t>[100, 2]</a:t>
               </a:r>
             </a:p>
           </p:txBody>
@@ -4681,7 +4525,7 @@
           </p:nvCxnSpPr>
           <p:spPr>
             <a:xfrm>
-              <a:off x="4976471" y="1074177"/>
+              <a:off x="3381107" y="1117246"/>
               <a:ext cx="0" cy="645559"/>
             </a:xfrm>
             <a:prstGeom prst="line">
@@ -4724,8 +4568,8 @@
           </p:nvSpPr>
           <p:spPr>
             <a:xfrm>
-              <a:off x="4957322" y="1241065"/>
-              <a:ext cx="607859" cy="261610"/>
+              <a:off x="3361958" y="1284134"/>
+              <a:ext cx="644728" cy="276999"/>
             </a:xfrm>
             <a:prstGeom prst="rect">
               <a:avLst/>
@@ -4739,7 +4583,7 @@
             <a:lstStyle/>
             <a:p>
               <a:r>
-                <a:rPr lang="en-US" sz="1100">
+                <a:rPr lang="en-US" sz="1200">
                   <a:latin typeface="CMU Serif Roman" panose="02000603000000000000" pitchFamily="2" charset="0"/>
                   <a:ea typeface="CMU Serif Roman" panose="02000603000000000000" pitchFamily="2" charset="0"/>
                   <a:cs typeface="CMU Serif Roman" panose="02000603000000000000" pitchFamily="2" charset="0"/>
@@ -4749,13 +4593,133 @@
             </a:p>
           </p:txBody>
         </p:sp>
+        <p:pic>
+          <p:nvPicPr>
+            <p:cNvPr id="10" name="Picture 9">
+              <a:extLst>
+                <a:ext uri="{FF2B5EF4-FFF2-40B4-BE49-F238E27FC236}">
+                  <a16:creationId xmlns:a16="http://schemas.microsoft.com/office/drawing/2014/main" id="{FBED5683-EB76-B648-A07B-C44B92F29AB3}"/>
+                </a:ext>
+              </a:extLst>
+            </p:cNvPr>
+            <p:cNvPicPr>
+              <a:picLocks noChangeAspect="1"/>
+            </p:cNvPicPr>
+            <p:nvPr/>
+          </p:nvPicPr>
+          <p:blipFill>
+            <a:blip r:embed="rId3"/>
+            <a:stretch>
+              <a:fillRect/>
+            </a:stretch>
+          </p:blipFill>
+          <p:spPr>
+            <a:xfrm>
+              <a:off x="1960036" y="826597"/>
+              <a:ext cx="153591" cy="154171"/>
+            </a:xfrm>
+            <a:prstGeom prst="rect">
+              <a:avLst/>
+            </a:prstGeom>
+          </p:spPr>
+        </p:pic>
+        <p:pic>
+          <p:nvPicPr>
+            <p:cNvPr id="12" name="Picture 11">
+              <a:extLst>
+                <a:ext uri="{FF2B5EF4-FFF2-40B4-BE49-F238E27FC236}">
+                  <a16:creationId xmlns:a16="http://schemas.microsoft.com/office/drawing/2014/main" id="{64647381-8AB9-4B4F-B4E5-7EF0475A51F3}"/>
+                </a:ext>
+              </a:extLst>
+            </p:cNvPr>
+            <p:cNvPicPr>
+              <a:picLocks noChangeAspect="1"/>
+            </p:cNvPicPr>
+            <p:nvPr/>
+          </p:nvPicPr>
+          <p:blipFill>
+            <a:blip r:embed="rId4"/>
+            <a:stretch>
+              <a:fillRect/>
+            </a:stretch>
+          </p:blipFill>
+          <p:spPr>
+            <a:xfrm>
+              <a:off x="1931580" y="1801066"/>
+              <a:ext cx="294907" cy="296020"/>
+            </a:xfrm>
+            <a:prstGeom prst="rect">
+              <a:avLst/>
+            </a:prstGeom>
+          </p:spPr>
+        </p:pic>
+        <p:pic>
+          <p:nvPicPr>
+            <p:cNvPr id="14" name="Picture 13">
+              <a:extLst>
+                <a:ext uri="{FF2B5EF4-FFF2-40B4-BE49-F238E27FC236}">
+                  <a16:creationId xmlns:a16="http://schemas.microsoft.com/office/drawing/2014/main" id="{3F2059C5-964E-D74E-BC84-C4D66804367D}"/>
+                </a:ext>
+              </a:extLst>
+            </p:cNvPr>
+            <p:cNvPicPr>
+              <a:picLocks noChangeAspect="1"/>
+            </p:cNvPicPr>
+            <p:nvPr/>
+          </p:nvPicPr>
+          <p:blipFill>
+            <a:blip r:embed="rId5"/>
+            <a:stretch>
+              <a:fillRect/>
+            </a:stretch>
+          </p:blipFill>
+          <p:spPr>
+            <a:xfrm>
+              <a:off x="3262410" y="1792581"/>
+              <a:ext cx="300101" cy="301233"/>
+            </a:xfrm>
+            <a:prstGeom prst="rect">
+              <a:avLst/>
+            </a:prstGeom>
+          </p:spPr>
+        </p:pic>
+        <p:pic>
+          <p:nvPicPr>
+            <p:cNvPr id="16" name="Picture 15">
+              <a:extLst>
+                <a:ext uri="{FF2B5EF4-FFF2-40B4-BE49-F238E27FC236}">
+                  <a16:creationId xmlns:a16="http://schemas.microsoft.com/office/drawing/2014/main" id="{313D0C84-B367-FA4A-975F-EE8931F42C21}"/>
+                </a:ext>
+              </a:extLst>
+            </p:cNvPr>
+            <p:cNvPicPr>
+              <a:picLocks noChangeAspect="1"/>
+            </p:cNvPicPr>
+            <p:nvPr/>
+          </p:nvPicPr>
+          <p:blipFill>
+            <a:blip r:embed="rId6"/>
+            <a:stretch>
+              <a:fillRect/>
+            </a:stretch>
+          </p:blipFill>
+          <p:spPr>
+            <a:xfrm>
+              <a:off x="3247405" y="739328"/>
+              <a:ext cx="317953" cy="319153"/>
+            </a:xfrm>
+            <a:prstGeom prst="rect">
+              <a:avLst/>
+            </a:prstGeom>
+          </p:spPr>
+        </p:pic>
       </p:grpSp>
       <p:grpSp>
         <p:nvGrpSpPr>
-          <p:cNvPr id="273" name="Group 272">
+          <p:cNvPr id="34" name="Group 33">
             <a:extLst>
               <a:ext uri="{FF2B5EF4-FFF2-40B4-BE49-F238E27FC236}">
-                <a16:creationId xmlns:a16="http://schemas.microsoft.com/office/drawing/2014/main" id="{42ADEB59-963F-E745-AD35-E374A262968F}"/>
+                <a16:creationId xmlns:a16="http://schemas.microsoft.com/office/drawing/2014/main" id="{659B276B-B1F4-7247-970A-9B4F3039F132}"/>
               </a:ext>
             </a:extLst>
           </p:cNvPr>
@@ -4764,106 +4728,12 @@
         </p:nvGrpSpPr>
         <p:grpSpPr>
           <a:xfrm>
-            <a:off x="5715043" y="273298"/>
-            <a:ext cx="5410306" cy="2257876"/>
-            <a:chOff x="5715043" y="273298"/>
-            <a:chExt cx="5410306" cy="2257876"/>
+            <a:off x="5684153" y="273298"/>
+            <a:ext cx="5478065" cy="2257876"/>
+            <a:chOff x="5684153" y="273298"/>
+            <a:chExt cx="5478065" cy="2257876"/>
           </a:xfrm>
         </p:grpSpPr>
-        <p:sp>
-          <p:nvSpPr>
-            <p:cNvPr id="126" name="TextBox 125">
-              <a:extLst>
-                <a:ext uri="{FF2B5EF4-FFF2-40B4-BE49-F238E27FC236}">
-                  <a16:creationId xmlns:a16="http://schemas.microsoft.com/office/drawing/2014/main" id="{A7366B4D-98F5-3A41-9D87-3FAAD019EDDF}"/>
-                </a:ext>
-              </a:extLst>
-            </p:cNvPr>
-            <p:cNvSpPr txBox="1"/>
-            <p:nvPr/>
-          </p:nvSpPr>
-          <p:spPr>
-            <a:xfrm>
-              <a:off x="10367463" y="1714573"/>
-              <a:ext cx="391454" cy="400110"/>
-            </a:xfrm>
-            <a:prstGeom prst="rect">
-              <a:avLst/>
-            </a:prstGeom>
-            <a:noFill/>
-          </p:spPr>
-          <p:txBody>
-            <a:bodyPr wrap="none" rtlCol="0">
-              <a:spAutoFit/>
-            </a:bodyPr>
-            <a:lstStyle/>
-            <a:p>
-              <a:r>
-                <a:rPr lang="en-US" sz="2000" b="1">
-                  <a:latin typeface="CMU Serif Roman" panose="02000603000000000000" pitchFamily="2" charset="0"/>
-                  <a:ea typeface="CMU Serif Roman" panose="02000603000000000000" pitchFamily="2" charset="0"/>
-                  <a:cs typeface="CMU Serif Roman" panose="02000603000000000000" pitchFamily="2" charset="0"/>
-                </a:rPr>
-                <a:t>v’</a:t>
-              </a:r>
-            </a:p>
-          </p:txBody>
-        </p:sp>
-        <p:sp>
-          <p:nvSpPr>
-            <p:cNvPr id="92" name="TextBox 91">
-              <a:extLst>
-                <a:ext uri="{FF2B5EF4-FFF2-40B4-BE49-F238E27FC236}">
-                  <a16:creationId xmlns:a16="http://schemas.microsoft.com/office/drawing/2014/main" id="{30A6D5FC-DE7D-1B4E-AFB2-4A8CA0790374}"/>
-                </a:ext>
-              </a:extLst>
-            </p:cNvPr>
-            <p:cNvSpPr txBox="1"/>
-            <p:nvPr/>
-          </p:nvSpPr>
-          <p:spPr>
-            <a:xfrm>
-              <a:off x="7718286" y="1725429"/>
-              <a:ext cx="412292" cy="400110"/>
-            </a:xfrm>
-            <a:prstGeom prst="rect">
-              <a:avLst/>
-            </a:prstGeom>
-            <a:noFill/>
-          </p:spPr>
-          <p:txBody>
-            <a:bodyPr wrap="none" rtlCol="0">
-              <a:spAutoFit/>
-            </a:bodyPr>
-            <a:lstStyle/>
-            <a:p>
-              <a:r>
-                <a:rPr lang="en-US" sz="2000" b="1">
-                  <a:latin typeface="CMU Serif Roman" panose="02000603000000000000" pitchFamily="2" charset="0"/>
-                  <a:ea typeface="CMU Serif Roman" panose="02000603000000000000" pitchFamily="2" charset="0"/>
-                  <a:cs typeface="CMU Serif Roman" panose="02000603000000000000" pitchFamily="2" charset="0"/>
-                </a:rPr>
-                <a:t>i</a:t>
-              </a:r>
-              <a:r>
-                <a:rPr lang="en-US" sz="2000" b="1" baseline="-25000">
-                  <a:latin typeface="CMU Serif Roman" panose="02000603000000000000" pitchFamily="2" charset="0"/>
-                  <a:ea typeface="CMU Serif Roman" panose="02000603000000000000" pitchFamily="2" charset="0"/>
-                  <a:cs typeface="CMU Serif Roman" panose="02000603000000000000" pitchFamily="2" charset="0"/>
-                </a:rPr>
-                <a:t>1</a:t>
-              </a:r>
-              <a:r>
-                <a:rPr lang="en-US" sz="2000" b="1">
-                  <a:latin typeface="CMU Serif Roman" panose="02000603000000000000" pitchFamily="2" charset="0"/>
-                  <a:ea typeface="CMU Serif Roman" panose="02000603000000000000" pitchFamily="2" charset="0"/>
-                  <a:cs typeface="CMU Serif Roman" panose="02000603000000000000" pitchFamily="2" charset="0"/>
-                </a:rPr>
-                <a:t>’</a:t>
-              </a:r>
-            </a:p>
-          </p:txBody>
-        </p:sp>
         <p:sp>
           <p:nvSpPr>
             <p:cNvPr id="85" name="Oval 84">
@@ -4922,45 +4792,6 @@
         </p:sp>
         <p:sp>
           <p:nvSpPr>
-            <p:cNvPr id="86" name="TextBox 85">
-              <a:extLst>
-                <a:ext uri="{FF2B5EF4-FFF2-40B4-BE49-F238E27FC236}">
-                  <a16:creationId xmlns:a16="http://schemas.microsoft.com/office/drawing/2014/main" id="{60349056-AF90-9549-A745-D264D52ABF51}"/>
-                </a:ext>
-              </a:extLst>
-            </p:cNvPr>
-            <p:cNvSpPr txBox="1"/>
-            <p:nvPr/>
-          </p:nvSpPr>
-          <p:spPr>
-            <a:xfrm>
-              <a:off x="6403204" y="638081"/>
-              <a:ext cx="285656" cy="400110"/>
-            </a:xfrm>
-            <a:prstGeom prst="rect">
-              <a:avLst/>
-            </a:prstGeom>
-            <a:noFill/>
-          </p:spPr>
-          <p:txBody>
-            <a:bodyPr wrap="none" rtlCol="0">
-              <a:spAutoFit/>
-            </a:bodyPr>
-            <a:lstStyle/>
-            <a:p>
-              <a:r>
-                <a:rPr lang="en-US" sz="2000" b="1">
-                  <a:latin typeface="CMU Serif Roman" panose="02000603000000000000" pitchFamily="2" charset="0"/>
-                  <a:ea typeface="CMU Serif Roman" panose="02000603000000000000" pitchFamily="2" charset="0"/>
-                  <a:cs typeface="CMU Serif Roman" panose="02000603000000000000" pitchFamily="2" charset="0"/>
-                </a:rPr>
-                <a:t>s</a:t>
-              </a:r>
-            </a:p>
-          </p:txBody>
-        </p:sp>
-        <p:sp>
-          <p:nvSpPr>
             <p:cNvPr id="87" name="Oval 86">
               <a:extLst>
                 <a:ext uri="{FF2B5EF4-FFF2-40B4-BE49-F238E27FC236}">
@@ -5017,58 +4848,6 @@
         </p:sp>
         <p:sp>
           <p:nvSpPr>
-            <p:cNvPr id="88" name="TextBox 87">
-              <a:extLst>
-                <a:ext uri="{FF2B5EF4-FFF2-40B4-BE49-F238E27FC236}">
-                  <a16:creationId xmlns:a16="http://schemas.microsoft.com/office/drawing/2014/main" id="{D12B19B0-3E1A-4A46-A422-89CD70323A31}"/>
-                </a:ext>
-              </a:extLst>
-            </p:cNvPr>
-            <p:cNvSpPr txBox="1"/>
-            <p:nvPr/>
-          </p:nvSpPr>
-          <p:spPr>
-            <a:xfrm>
-              <a:off x="7728208" y="648395"/>
-              <a:ext cx="340158" cy="400110"/>
-            </a:xfrm>
-            <a:prstGeom prst="rect">
-              <a:avLst/>
-            </a:prstGeom>
-            <a:noFill/>
-          </p:spPr>
-          <p:txBody>
-            <a:bodyPr wrap="none" rtlCol="0">
-              <a:spAutoFit/>
-            </a:bodyPr>
-            <a:lstStyle/>
-            <a:p>
-              <a:r>
-                <a:rPr lang="en-US" sz="2000" b="1">
-                  <a:latin typeface="CMU Serif Roman" panose="02000603000000000000" pitchFamily="2" charset="0"/>
-                  <a:ea typeface="CMU Serif Roman" panose="02000603000000000000" pitchFamily="2" charset="0"/>
-                  <a:cs typeface="CMU Serif Roman" panose="02000603000000000000" pitchFamily="2" charset="0"/>
-                </a:rPr>
-                <a:t>i</a:t>
-              </a:r>
-              <a:r>
-                <a:rPr lang="en-US" sz="2000" b="1" baseline="-25000">
-                  <a:latin typeface="CMU Serif Roman" panose="02000603000000000000" pitchFamily="2" charset="0"/>
-                  <a:ea typeface="CMU Serif Roman" panose="02000603000000000000" pitchFamily="2" charset="0"/>
-                  <a:cs typeface="CMU Serif Roman" panose="02000603000000000000" pitchFamily="2" charset="0"/>
-                </a:rPr>
-                <a:t>1</a:t>
-              </a:r>
-              <a:endParaRPr lang="en-US" sz="2000" b="1">
-                <a:latin typeface="CMU Serif Roman" panose="02000603000000000000" pitchFamily="2" charset="0"/>
-                <a:ea typeface="CMU Serif Roman" panose="02000603000000000000" pitchFamily="2" charset="0"/>
-                <a:cs typeface="CMU Serif Roman" panose="02000603000000000000" pitchFamily="2" charset="0"/>
-              </a:endParaRPr>
-            </a:p>
-          </p:txBody>
-        </p:sp>
-        <p:sp>
-          <p:nvSpPr>
             <p:cNvPr id="89" name="Oval 88">
               <a:extLst>
                 <a:ext uri="{FF2B5EF4-FFF2-40B4-BE49-F238E27FC236}">
@@ -5120,45 +4899,6 @@
                 <a:ea typeface="CMU Serif Roman" panose="02000603000000000000" pitchFamily="2" charset="0"/>
                 <a:cs typeface="CMU Serif Roman" panose="02000603000000000000" pitchFamily="2" charset="0"/>
               </a:endParaRPr>
-            </a:p>
-          </p:txBody>
-        </p:sp>
-        <p:sp>
-          <p:nvSpPr>
-            <p:cNvPr id="90" name="TextBox 89">
-              <a:extLst>
-                <a:ext uri="{FF2B5EF4-FFF2-40B4-BE49-F238E27FC236}">
-                  <a16:creationId xmlns:a16="http://schemas.microsoft.com/office/drawing/2014/main" id="{C6C4F11C-44B2-3B4B-8C38-8D7269949B28}"/>
-                </a:ext>
-              </a:extLst>
-            </p:cNvPr>
-            <p:cNvSpPr txBox="1"/>
-            <p:nvPr/>
-          </p:nvSpPr>
-          <p:spPr>
-            <a:xfrm>
-              <a:off x="6399806" y="1719961"/>
-              <a:ext cx="354584" cy="400110"/>
-            </a:xfrm>
-            <a:prstGeom prst="rect">
-              <a:avLst/>
-            </a:prstGeom>
-            <a:noFill/>
-          </p:spPr>
-          <p:txBody>
-            <a:bodyPr wrap="none" rtlCol="0">
-              <a:spAutoFit/>
-            </a:bodyPr>
-            <a:lstStyle/>
-            <a:p>
-              <a:r>
-                <a:rPr lang="en-US" sz="2000" b="1">
-                  <a:latin typeface="CMU Serif Roman" panose="02000603000000000000" pitchFamily="2" charset="0"/>
-                  <a:ea typeface="CMU Serif Roman" panose="02000603000000000000" pitchFamily="2" charset="0"/>
-                  <a:cs typeface="CMU Serif Roman" panose="02000603000000000000" pitchFamily="2" charset="0"/>
-                </a:rPr>
-                <a:t>s’</a:t>
-              </a:r>
             </a:p>
           </p:txBody>
         </p:sp>
@@ -5604,8 +5344,8 @@
           </p:nvSpPr>
           <p:spPr>
             <a:xfrm>
-              <a:off x="5800768" y="273298"/>
-              <a:ext cx="1367682" cy="307777"/>
+              <a:off x="5751344" y="273298"/>
+              <a:ext cx="1467068" cy="307777"/>
             </a:xfrm>
             <a:prstGeom prst="rect">
               <a:avLst/>
@@ -5624,7 +5364,7 @@
                   <a:ea typeface="CMU Serif Roman" panose="02000603000000000000" pitchFamily="2" charset="0"/>
                   <a:cs typeface="CMU Serif Roman" panose="02000603000000000000" pitchFamily="2" charset="0"/>
                 </a:rPr>
-                <a:t>[[[1,2],[3]], [[4]]]</a:t>
+                <a:t>[[[1, 2], [3]], [[4]]]</a:t>
               </a:r>
             </a:p>
           </p:txBody>
@@ -5644,7 +5384,7 @@
           <p:spPr>
             <a:xfrm>
               <a:off x="7455487" y="275198"/>
-              <a:ext cx="861133" cy="307777"/>
+              <a:ext cx="970137" cy="307777"/>
             </a:xfrm>
             <a:prstGeom prst="rect">
               <a:avLst/>
@@ -5663,7 +5403,7 @@
                   <a:ea typeface="CMU Serif Roman" panose="02000603000000000000" pitchFamily="2" charset="0"/>
                   <a:cs typeface="CMU Serif Roman" panose="02000603000000000000" pitchFamily="2" charset="0"/>
                 </a:rPr>
-                <a:t>[[1,2],[3]]</a:t>
+                <a:t>[[1, 2], [3]]</a:t>
               </a:r>
             </a:p>
           </p:txBody>
@@ -5683,7 +5423,7 @@
           <p:spPr>
             <a:xfrm>
               <a:off x="7417014" y="2223397"/>
-              <a:ext cx="1031051" cy="307777"/>
+              <a:ext cx="1149674" cy="307777"/>
             </a:xfrm>
             <a:prstGeom prst="rect">
               <a:avLst/>
@@ -5702,7 +5442,7 @@
                   <a:ea typeface="CMU Serif Roman" panose="02000603000000000000" pitchFamily="2" charset="0"/>
                   <a:cs typeface="CMU Serif Roman" panose="02000603000000000000" pitchFamily="2" charset="0"/>
                 </a:rPr>
-                <a:t>[[100,2],[3]]</a:t>
+                <a:t>[[100, 2], [3]]</a:t>
               </a:r>
             </a:p>
           </p:txBody>
@@ -5769,7 +5509,7 @@
           <p:spPr>
             <a:xfrm>
               <a:off x="10517490" y="1255025"/>
-              <a:ext cx="607859" cy="261610"/>
+              <a:ext cx="644728" cy="276999"/>
             </a:xfrm>
             <a:prstGeom prst="rect">
               <a:avLst/>
@@ -5783,7 +5523,7 @@
             <a:lstStyle/>
             <a:p>
               <a:r>
-                <a:rPr lang="en-US" sz="1100">
+                <a:rPr lang="en-US" sz="1200">
                   <a:latin typeface="CMU Serif Roman" panose="02000603000000000000" pitchFamily="2" charset="0"/>
                   <a:ea typeface="CMU Serif Roman" panose="02000603000000000000" pitchFamily="2" charset="0"/>
                   <a:cs typeface="CMU Serif Roman" panose="02000603000000000000" pitchFamily="2" charset="0"/>
@@ -5851,58 +5591,6 @@
         </p:sp>
         <p:sp>
           <p:nvSpPr>
-            <p:cNvPr id="109" name="TextBox 108">
-              <a:extLst>
-                <a:ext uri="{FF2B5EF4-FFF2-40B4-BE49-F238E27FC236}">
-                  <a16:creationId xmlns:a16="http://schemas.microsoft.com/office/drawing/2014/main" id="{0A376E8C-3C9B-DB4E-A475-2514070B9E4F}"/>
-                </a:ext>
-              </a:extLst>
-            </p:cNvPr>
-            <p:cNvSpPr txBox="1"/>
-            <p:nvPr/>
-          </p:nvSpPr>
-          <p:spPr>
-            <a:xfrm>
-              <a:off x="9047853" y="642927"/>
-              <a:ext cx="340158" cy="400110"/>
-            </a:xfrm>
-            <a:prstGeom prst="rect">
-              <a:avLst/>
-            </a:prstGeom>
-            <a:noFill/>
-          </p:spPr>
-          <p:txBody>
-            <a:bodyPr wrap="none" rtlCol="0">
-              <a:spAutoFit/>
-            </a:bodyPr>
-            <a:lstStyle/>
-            <a:p>
-              <a:r>
-                <a:rPr lang="en-US" sz="2000" b="1">
-                  <a:latin typeface="CMU Serif Roman" panose="02000603000000000000" pitchFamily="2" charset="0"/>
-                  <a:ea typeface="CMU Serif Roman" panose="02000603000000000000" pitchFamily="2" charset="0"/>
-                  <a:cs typeface="CMU Serif Roman" panose="02000603000000000000" pitchFamily="2" charset="0"/>
-                </a:rPr>
-                <a:t>i</a:t>
-              </a:r>
-              <a:r>
-                <a:rPr lang="en-US" sz="2000" b="1" baseline="-25000">
-                  <a:latin typeface="CMU Serif Roman" panose="02000603000000000000" pitchFamily="2" charset="0"/>
-                  <a:ea typeface="CMU Serif Roman" panose="02000603000000000000" pitchFamily="2" charset="0"/>
-                  <a:cs typeface="CMU Serif Roman" panose="02000603000000000000" pitchFamily="2" charset="0"/>
-                </a:rPr>
-                <a:t>2</a:t>
-              </a:r>
-              <a:endParaRPr lang="en-US" sz="2000" b="1">
-                <a:latin typeface="CMU Serif Roman" panose="02000603000000000000" pitchFamily="2" charset="0"/>
-                <a:ea typeface="CMU Serif Roman" panose="02000603000000000000" pitchFamily="2" charset="0"/>
-                <a:cs typeface="CMU Serif Roman" panose="02000603000000000000" pitchFamily="2" charset="0"/>
-              </a:endParaRPr>
-            </a:p>
-          </p:txBody>
-        </p:sp>
-        <p:sp>
-          <p:nvSpPr>
             <p:cNvPr id="112" name="Oval 111">
               <a:extLst>
                 <a:ext uri="{FF2B5EF4-FFF2-40B4-BE49-F238E27FC236}">
@@ -5954,61 +5642,6 @@
                 <a:ea typeface="CMU Serif Roman" panose="02000603000000000000" pitchFamily="2" charset="0"/>
                 <a:cs typeface="CMU Serif Roman" panose="02000603000000000000" pitchFamily="2" charset="0"/>
               </a:endParaRPr>
-            </a:p>
-          </p:txBody>
-        </p:sp>
-        <p:sp>
-          <p:nvSpPr>
-            <p:cNvPr id="113" name="TextBox 112">
-              <a:extLst>
-                <a:ext uri="{FF2B5EF4-FFF2-40B4-BE49-F238E27FC236}">
-                  <a16:creationId xmlns:a16="http://schemas.microsoft.com/office/drawing/2014/main" id="{8DCD2F11-0C68-AE4C-8A9F-4367CC6AF734}"/>
-                </a:ext>
-              </a:extLst>
-            </p:cNvPr>
-            <p:cNvSpPr txBox="1"/>
-            <p:nvPr/>
-          </p:nvSpPr>
-          <p:spPr>
-            <a:xfrm>
-              <a:off x="9037931" y="1719961"/>
-              <a:ext cx="412292" cy="400110"/>
-            </a:xfrm>
-            <a:prstGeom prst="rect">
-              <a:avLst/>
-            </a:prstGeom>
-            <a:noFill/>
-          </p:spPr>
-          <p:txBody>
-            <a:bodyPr wrap="none" rtlCol="0">
-              <a:spAutoFit/>
-            </a:bodyPr>
-            <a:lstStyle/>
-            <a:p>
-              <a:r>
-                <a:rPr lang="en-US" sz="2000" b="1">
-                  <a:latin typeface="CMU Serif Roman" panose="02000603000000000000" pitchFamily="2" charset="0"/>
-                  <a:ea typeface="CMU Serif Roman" panose="02000603000000000000" pitchFamily="2" charset="0"/>
-                  <a:cs typeface="CMU Serif Roman" panose="02000603000000000000" pitchFamily="2" charset="0"/>
-                </a:rPr>
-                <a:t>i</a:t>
-              </a:r>
-              <a:r>
-                <a:rPr lang="en-US" sz="2000" b="1" baseline="-25000">
-                  <a:latin typeface="CMU Serif Roman" panose="02000603000000000000" pitchFamily="2" charset="0"/>
-                  <a:ea typeface="CMU Serif Roman" panose="02000603000000000000" pitchFamily="2" charset="0"/>
-                  <a:cs typeface="CMU Serif Roman" panose="02000603000000000000" pitchFamily="2" charset="0"/>
-                </a:rPr>
-                <a:t>2</a:t>
-              </a:r>
-              <a:r>
-                <a:rPr lang="en-US" sz="2000" b="1">
-                  <a:latin typeface="CMU Serif Roman" panose="02000603000000000000" pitchFamily="2" charset="0"/>
-                  <a:ea typeface="CMU Serif Roman" panose="02000603000000000000" pitchFamily="2" charset="0"/>
-                  <a:cs typeface="CMU Serif Roman" panose="02000603000000000000" pitchFamily="2" charset="0"/>
-                </a:rPr>
-                <a:t>’</a:t>
-              </a:r>
             </a:p>
           </p:txBody>
         </p:sp>
@@ -6364,45 +5997,6 @@
         </p:sp>
         <p:sp>
           <p:nvSpPr>
-            <p:cNvPr id="122" name="TextBox 121">
-              <a:extLst>
-                <a:ext uri="{FF2B5EF4-FFF2-40B4-BE49-F238E27FC236}">
-                  <a16:creationId xmlns:a16="http://schemas.microsoft.com/office/drawing/2014/main" id="{E01448E0-4A28-8E46-8A5F-9090008A88AB}"/>
-                </a:ext>
-              </a:extLst>
-            </p:cNvPr>
-            <p:cNvSpPr txBox="1"/>
-            <p:nvPr/>
-          </p:nvSpPr>
-          <p:spPr>
-            <a:xfrm>
-              <a:off x="10377385" y="637539"/>
-              <a:ext cx="319318" cy="400110"/>
-            </a:xfrm>
-            <a:prstGeom prst="rect">
-              <a:avLst/>
-            </a:prstGeom>
-            <a:noFill/>
-          </p:spPr>
-          <p:txBody>
-            <a:bodyPr wrap="none" rtlCol="0">
-              <a:spAutoFit/>
-            </a:bodyPr>
-            <a:lstStyle/>
-            <a:p>
-              <a:r>
-                <a:rPr lang="en-US" sz="2000" b="1">
-                  <a:latin typeface="CMU Serif Roman" panose="02000603000000000000" pitchFamily="2" charset="0"/>
-                  <a:ea typeface="CMU Serif Roman" panose="02000603000000000000" pitchFamily="2" charset="0"/>
-                  <a:cs typeface="CMU Serif Roman" panose="02000603000000000000" pitchFamily="2" charset="0"/>
-                </a:rPr>
-                <a:t>v</a:t>
-              </a:r>
-            </a:p>
-          </p:txBody>
-        </p:sp>
-        <p:sp>
-          <p:nvSpPr>
             <p:cNvPr id="125" name="Oval 124">
               <a:extLst>
                 <a:ext uri="{FF2B5EF4-FFF2-40B4-BE49-F238E27FC236}">
@@ -6804,7 +6398,7 @@
           <p:spPr>
             <a:xfrm>
               <a:off x="8954879" y="279725"/>
-              <a:ext cx="516488" cy="307777"/>
+              <a:ext cx="572593" cy="307777"/>
             </a:xfrm>
             <a:prstGeom prst="rect">
               <a:avLst/>
@@ -6823,7 +6417,7 @@
                   <a:ea typeface="CMU Serif Roman" panose="02000603000000000000" pitchFamily="2" charset="0"/>
                   <a:cs typeface="CMU Serif Roman" panose="02000603000000000000" pitchFamily="2" charset="0"/>
                 </a:rPr>
-                <a:t>[1,2]</a:t>
+                <a:t>[1, 2]</a:t>
               </a:r>
             </a:p>
           </p:txBody>
@@ -6881,8 +6475,8 @@
           </p:nvSpPr>
           <p:spPr>
             <a:xfrm>
-              <a:off x="5715043" y="2223397"/>
-              <a:ext cx="1547218" cy="307777"/>
+              <a:off x="5684153" y="2223397"/>
+              <a:ext cx="1646605" cy="307777"/>
             </a:xfrm>
             <a:prstGeom prst="rect">
               <a:avLst/>
@@ -6901,7 +6495,7 @@
                   <a:ea typeface="CMU Serif Roman" panose="02000603000000000000" pitchFamily="2" charset="0"/>
                   <a:cs typeface="CMU Serif Roman" panose="02000603000000000000" pitchFamily="2" charset="0"/>
                 </a:rPr>
-                <a:t>[[[100,2],[3]], [[4]]]</a:t>
+                <a:t>[[[100, 2], [3]], [[4]]]</a:t>
               </a:r>
             </a:p>
           </p:txBody>
@@ -6921,7 +6515,7 @@
           <p:spPr>
             <a:xfrm>
               <a:off x="8865111" y="2223396"/>
-              <a:ext cx="696024" cy="307777"/>
+              <a:ext cx="752129" cy="307777"/>
             </a:xfrm>
             <a:prstGeom prst="rect">
               <a:avLst/>
@@ -6940,7 +6534,7 @@
                   <a:ea typeface="CMU Serif Roman" panose="02000603000000000000" pitchFamily="2" charset="0"/>
                   <a:cs typeface="CMU Serif Roman" panose="02000603000000000000" pitchFamily="2" charset="0"/>
                 </a:rPr>
-                <a:t>[100,2]</a:t>
+                <a:t>[100, 2]</a:t>
               </a:r>
             </a:p>
           </p:txBody>
@@ -7101,13 +6695,253 @@
             </a:p>
           </p:txBody>
         </p:sp>
+        <p:pic>
+          <p:nvPicPr>
+            <p:cNvPr id="148" name="Picture 147">
+              <a:extLst>
+                <a:ext uri="{FF2B5EF4-FFF2-40B4-BE49-F238E27FC236}">
+                  <a16:creationId xmlns:a16="http://schemas.microsoft.com/office/drawing/2014/main" id="{DF76C864-55C4-E94A-9B75-1A31430190E3}"/>
+                </a:ext>
+              </a:extLst>
+            </p:cNvPr>
+            <p:cNvPicPr>
+              <a:picLocks noChangeAspect="1"/>
+            </p:cNvPicPr>
+            <p:nvPr/>
+          </p:nvPicPr>
+          <p:blipFill>
+            <a:blip r:embed="rId3"/>
+            <a:stretch>
+              <a:fillRect/>
+            </a:stretch>
+          </p:blipFill>
+          <p:spPr>
+            <a:xfrm>
+              <a:off x="6474271" y="779894"/>
+              <a:ext cx="153591" cy="154171"/>
+            </a:xfrm>
+            <a:prstGeom prst="rect">
+              <a:avLst/>
+            </a:prstGeom>
+          </p:spPr>
+        </p:pic>
+        <p:pic>
+          <p:nvPicPr>
+            <p:cNvPr id="153" name="Picture 152">
+              <a:extLst>
+                <a:ext uri="{FF2B5EF4-FFF2-40B4-BE49-F238E27FC236}">
+                  <a16:creationId xmlns:a16="http://schemas.microsoft.com/office/drawing/2014/main" id="{506DC3A5-9148-D84C-995B-A002869F1F33}"/>
+                </a:ext>
+              </a:extLst>
+            </p:cNvPr>
+            <p:cNvPicPr>
+              <a:picLocks noChangeAspect="1"/>
+            </p:cNvPicPr>
+            <p:nvPr/>
+          </p:nvPicPr>
+          <p:blipFill>
+            <a:blip r:embed="rId4"/>
+            <a:stretch>
+              <a:fillRect/>
+            </a:stretch>
+          </p:blipFill>
+          <p:spPr>
+            <a:xfrm>
+              <a:off x="6427096" y="1756517"/>
+              <a:ext cx="294907" cy="296020"/>
+            </a:xfrm>
+            <a:prstGeom prst="rect">
+              <a:avLst/>
+            </a:prstGeom>
+          </p:spPr>
+        </p:pic>
+        <p:pic>
+          <p:nvPicPr>
+            <p:cNvPr id="159" name="Picture 158">
+              <a:extLst>
+                <a:ext uri="{FF2B5EF4-FFF2-40B4-BE49-F238E27FC236}">
+                  <a16:creationId xmlns:a16="http://schemas.microsoft.com/office/drawing/2014/main" id="{DD8DC1F8-77B4-AD43-BA54-B47D5DBFC560}"/>
+                </a:ext>
+              </a:extLst>
+            </p:cNvPr>
+            <p:cNvPicPr>
+              <a:picLocks noChangeAspect="1"/>
+            </p:cNvPicPr>
+            <p:nvPr/>
+          </p:nvPicPr>
+          <p:blipFill>
+            <a:blip r:embed="rId5"/>
+            <a:stretch>
+              <a:fillRect/>
+            </a:stretch>
+          </p:blipFill>
+          <p:spPr>
+            <a:xfrm>
+              <a:off x="10400781" y="1736723"/>
+              <a:ext cx="300101" cy="301233"/>
+            </a:xfrm>
+            <a:prstGeom prst="rect">
+              <a:avLst/>
+            </a:prstGeom>
+          </p:spPr>
+        </p:pic>
+        <p:pic>
+          <p:nvPicPr>
+            <p:cNvPr id="163" name="Picture 162">
+              <a:extLst>
+                <a:ext uri="{FF2B5EF4-FFF2-40B4-BE49-F238E27FC236}">
+                  <a16:creationId xmlns:a16="http://schemas.microsoft.com/office/drawing/2014/main" id="{B04851D1-2911-6C44-9AA0-638D6CD3A68F}"/>
+                </a:ext>
+              </a:extLst>
+            </p:cNvPr>
+            <p:cNvPicPr>
+              <a:picLocks noChangeAspect="1"/>
+            </p:cNvPicPr>
+            <p:nvPr/>
+          </p:nvPicPr>
+          <p:blipFill>
+            <a:blip r:embed="rId6"/>
+            <a:stretch>
+              <a:fillRect/>
+            </a:stretch>
+          </p:blipFill>
+          <p:spPr>
+            <a:xfrm>
+              <a:off x="10395343" y="690098"/>
+              <a:ext cx="317953" cy="319153"/>
+            </a:xfrm>
+            <a:prstGeom prst="rect">
+              <a:avLst/>
+            </a:prstGeom>
+          </p:spPr>
+        </p:pic>
+        <p:pic>
+          <p:nvPicPr>
+            <p:cNvPr id="18" name="Picture 17">
+              <a:extLst>
+                <a:ext uri="{FF2B5EF4-FFF2-40B4-BE49-F238E27FC236}">
+                  <a16:creationId xmlns:a16="http://schemas.microsoft.com/office/drawing/2014/main" id="{84127C59-43B8-FB40-93B0-AACE35E9DDC7}"/>
+                </a:ext>
+              </a:extLst>
+            </p:cNvPr>
+            <p:cNvPicPr>
+              <a:picLocks noChangeAspect="1"/>
+            </p:cNvPicPr>
+            <p:nvPr/>
+          </p:nvPicPr>
+          <p:blipFill>
+            <a:blip r:embed="rId7"/>
+            <a:stretch>
+              <a:fillRect/>
+            </a:stretch>
+          </p:blipFill>
+          <p:spPr>
+            <a:xfrm>
+              <a:off x="7763204" y="716951"/>
+              <a:ext cx="272610" cy="273639"/>
+            </a:xfrm>
+            <a:prstGeom prst="rect">
+              <a:avLst/>
+            </a:prstGeom>
+          </p:spPr>
+        </p:pic>
+        <p:pic>
+          <p:nvPicPr>
+            <p:cNvPr id="20" name="Picture 19">
+              <a:extLst>
+                <a:ext uri="{FF2B5EF4-FFF2-40B4-BE49-F238E27FC236}">
+                  <a16:creationId xmlns:a16="http://schemas.microsoft.com/office/drawing/2014/main" id="{9F5EDDFA-7EB5-5D43-B7B6-A9D4B945F392}"/>
+                </a:ext>
+              </a:extLst>
+            </p:cNvPr>
+            <p:cNvPicPr>
+              <a:picLocks noChangeAspect="1"/>
+            </p:cNvPicPr>
+            <p:nvPr/>
+          </p:nvPicPr>
+          <p:blipFill>
+            <a:blip r:embed="rId8"/>
+            <a:stretch>
+              <a:fillRect/>
+            </a:stretch>
+          </p:blipFill>
+          <p:spPr>
+            <a:xfrm>
+              <a:off x="9094894" y="714613"/>
+              <a:ext cx="265341" cy="266343"/>
+            </a:xfrm>
+            <a:prstGeom prst="rect">
+              <a:avLst/>
+            </a:prstGeom>
+          </p:spPr>
+        </p:pic>
+        <p:pic>
+          <p:nvPicPr>
+            <p:cNvPr id="26" name="Picture 25">
+              <a:extLst>
+                <a:ext uri="{FF2B5EF4-FFF2-40B4-BE49-F238E27FC236}">
+                  <a16:creationId xmlns:a16="http://schemas.microsoft.com/office/drawing/2014/main" id="{8C962910-8B1B-6143-9EB7-AFE2AE84E632}"/>
+                </a:ext>
+              </a:extLst>
+            </p:cNvPr>
+            <p:cNvPicPr>
+              <a:picLocks noChangeAspect="1"/>
+            </p:cNvPicPr>
+            <p:nvPr/>
+          </p:nvPicPr>
+          <p:blipFill>
+            <a:blip r:embed="rId9"/>
+            <a:stretch>
+              <a:fillRect/>
+            </a:stretch>
+          </p:blipFill>
+          <p:spPr>
+            <a:xfrm>
+              <a:off x="7744222" y="1787023"/>
+              <a:ext cx="299309" cy="300334"/>
+            </a:xfrm>
+            <a:prstGeom prst="rect">
+              <a:avLst/>
+            </a:prstGeom>
+          </p:spPr>
+        </p:pic>
+        <p:pic>
+          <p:nvPicPr>
+            <p:cNvPr id="28" name="Picture 27">
+              <a:extLst>
+                <a:ext uri="{FF2B5EF4-FFF2-40B4-BE49-F238E27FC236}">
+                  <a16:creationId xmlns:a16="http://schemas.microsoft.com/office/drawing/2014/main" id="{B0228BE8-3D3F-1348-8CE4-D7A14C4ABE49}"/>
+                </a:ext>
+              </a:extLst>
+            </p:cNvPr>
+            <p:cNvPicPr>
+              <a:picLocks noChangeAspect="1"/>
+            </p:cNvPicPr>
+            <p:nvPr/>
+          </p:nvPicPr>
+          <p:blipFill>
+            <a:blip r:embed="rId10"/>
+            <a:stretch>
+              <a:fillRect/>
+            </a:stretch>
+          </p:blipFill>
+          <p:spPr>
+            <a:xfrm>
+              <a:off x="9068571" y="1789206"/>
+              <a:ext cx="293769" cy="294775"/>
+            </a:xfrm>
+            <a:prstGeom prst="rect">
+              <a:avLst/>
+            </a:prstGeom>
+          </p:spPr>
+        </p:pic>
       </p:grpSp>
       <p:grpSp>
         <p:nvGrpSpPr>
-          <p:cNvPr id="6" name="Group 5">
+          <p:cNvPr id="35" name="Group 34">
             <a:extLst>
               <a:ext uri="{FF2B5EF4-FFF2-40B4-BE49-F238E27FC236}">
-                <a16:creationId xmlns:a16="http://schemas.microsoft.com/office/drawing/2014/main" id="{2F89EE3D-5E31-6A4C-86F6-40AAC5A61B77}"/>
+                <a16:creationId xmlns:a16="http://schemas.microsoft.com/office/drawing/2014/main" id="{D7456CDA-A0BB-CD4E-A87A-75B866971875}"/>
               </a:ext>
             </a:extLst>
           </p:cNvPr>
@@ -7117,9 +6951,9 @@
         <p:grpSpPr>
           <a:xfrm>
             <a:off x="2246761" y="3135349"/>
-            <a:ext cx="7566385" cy="3594103"/>
+            <a:ext cx="7665772" cy="3594103"/>
             <a:chOff x="2246761" y="3135349"/>
-            <a:chExt cx="7566385" cy="3594103"/>
+            <a:chExt cx="7665772" cy="3594103"/>
           </a:xfrm>
         </p:grpSpPr>
         <p:sp>
@@ -7202,45 +7036,6 @@
         </p:sp>
         <p:sp>
           <p:nvSpPr>
-            <p:cNvPr id="196" name="TextBox 195">
-              <a:extLst>
-                <a:ext uri="{FF2B5EF4-FFF2-40B4-BE49-F238E27FC236}">
-                  <a16:creationId xmlns:a16="http://schemas.microsoft.com/office/drawing/2014/main" id="{03B1394B-5A4D-114B-B1D1-4404C67E6D91}"/>
-                </a:ext>
-              </a:extLst>
-            </p:cNvPr>
-            <p:cNvSpPr txBox="1"/>
-            <p:nvPr/>
-          </p:nvSpPr>
-          <p:spPr>
-            <a:xfrm>
-              <a:off x="5250485" y="6020420"/>
-              <a:ext cx="391454" cy="400110"/>
-            </a:xfrm>
-            <a:prstGeom prst="rect">
-              <a:avLst/>
-            </a:prstGeom>
-            <a:noFill/>
-          </p:spPr>
-          <p:txBody>
-            <a:bodyPr wrap="none" rtlCol="0">
-              <a:spAutoFit/>
-            </a:bodyPr>
-            <a:lstStyle/>
-            <a:p>
-              <a:r>
-                <a:rPr lang="en-US" sz="2000" b="1">
-                  <a:latin typeface="CMU Serif Roman" panose="02000603000000000000" pitchFamily="2" charset="0"/>
-                  <a:ea typeface="CMU Serif Roman" panose="02000603000000000000" pitchFamily="2" charset="0"/>
-                  <a:cs typeface="CMU Serif Roman" panose="02000603000000000000" pitchFamily="2" charset="0"/>
-                </a:rPr>
-                <a:t>v’</a:t>
-              </a:r>
-            </a:p>
-          </p:txBody>
-        </p:sp>
-        <p:sp>
-          <p:nvSpPr>
             <p:cNvPr id="197" name="Oval 196">
               <a:extLst>
                 <a:ext uri="{FF2B5EF4-FFF2-40B4-BE49-F238E27FC236}">
@@ -7297,45 +7092,6 @@
         </p:sp>
         <p:sp>
           <p:nvSpPr>
-            <p:cNvPr id="198" name="TextBox 197">
-              <a:extLst>
-                <a:ext uri="{FF2B5EF4-FFF2-40B4-BE49-F238E27FC236}">
-                  <a16:creationId xmlns:a16="http://schemas.microsoft.com/office/drawing/2014/main" id="{4C3C53EC-B896-514C-9E24-0D1B29C87069}"/>
-                </a:ext>
-              </a:extLst>
-            </p:cNvPr>
-            <p:cNvSpPr txBox="1"/>
-            <p:nvPr/>
-          </p:nvSpPr>
-          <p:spPr>
-            <a:xfrm>
-              <a:off x="2824385" y="3476904"/>
-              <a:ext cx="285656" cy="400110"/>
-            </a:xfrm>
-            <a:prstGeom prst="rect">
-              <a:avLst/>
-            </a:prstGeom>
-            <a:noFill/>
-          </p:spPr>
-          <p:txBody>
-            <a:bodyPr wrap="none" rtlCol="0">
-              <a:spAutoFit/>
-            </a:bodyPr>
-            <a:lstStyle/>
-            <a:p>
-              <a:r>
-                <a:rPr lang="en-US" sz="2000" b="1">
-                  <a:latin typeface="CMU Serif Roman" panose="02000603000000000000" pitchFamily="2" charset="0"/>
-                  <a:ea typeface="CMU Serif Roman" panose="02000603000000000000" pitchFamily="2" charset="0"/>
-                  <a:cs typeface="CMU Serif Roman" panose="02000603000000000000" pitchFamily="2" charset="0"/>
-                </a:rPr>
-                <a:t>s</a:t>
-              </a:r>
-            </a:p>
-          </p:txBody>
-        </p:sp>
-        <p:sp>
-          <p:nvSpPr>
             <p:cNvPr id="199" name="Oval 198">
               <a:extLst>
                 <a:ext uri="{FF2B5EF4-FFF2-40B4-BE49-F238E27FC236}">
@@ -7392,58 +7148,6 @@
         </p:sp>
         <p:sp>
           <p:nvSpPr>
-            <p:cNvPr id="200" name="TextBox 199">
-              <a:extLst>
-                <a:ext uri="{FF2B5EF4-FFF2-40B4-BE49-F238E27FC236}">
-                  <a16:creationId xmlns:a16="http://schemas.microsoft.com/office/drawing/2014/main" id="{6DA53340-9800-BE46-BFBE-32C3F2ED286F}"/>
-                </a:ext>
-              </a:extLst>
-            </p:cNvPr>
-            <p:cNvSpPr txBox="1"/>
-            <p:nvPr/>
-          </p:nvSpPr>
-          <p:spPr>
-            <a:xfrm>
-              <a:off x="2783884" y="4327158"/>
-              <a:ext cx="412292" cy="400110"/>
-            </a:xfrm>
-            <a:prstGeom prst="rect">
-              <a:avLst/>
-            </a:prstGeom>
-            <a:noFill/>
-          </p:spPr>
-          <p:txBody>
-            <a:bodyPr wrap="none" rtlCol="0">
-              <a:spAutoFit/>
-            </a:bodyPr>
-            <a:lstStyle/>
-            <a:p>
-              <a:r>
-                <a:rPr lang="en-US" sz="2000" b="1">
-                  <a:latin typeface="CMU Serif Roman" panose="02000603000000000000" pitchFamily="2" charset="0"/>
-                  <a:ea typeface="CMU Serif Roman" panose="02000603000000000000" pitchFamily="2" charset="0"/>
-                  <a:cs typeface="CMU Serif Roman" panose="02000603000000000000" pitchFamily="2" charset="0"/>
-                </a:rPr>
-                <a:t>d</a:t>
-              </a:r>
-              <a:r>
-                <a:rPr lang="en-US" sz="2000" b="1" baseline="-25000">
-                  <a:latin typeface="CMU Serif Roman" panose="02000603000000000000" pitchFamily="2" charset="0"/>
-                  <a:ea typeface="CMU Serif Roman" panose="02000603000000000000" pitchFamily="2" charset="0"/>
-                  <a:cs typeface="CMU Serif Roman" panose="02000603000000000000" pitchFamily="2" charset="0"/>
-                </a:rPr>
-                <a:t>1</a:t>
-              </a:r>
-              <a:endParaRPr lang="en-US" sz="2000" b="1">
-                <a:latin typeface="CMU Serif Roman" panose="02000603000000000000" pitchFamily="2" charset="0"/>
-                <a:ea typeface="CMU Serif Roman" panose="02000603000000000000" pitchFamily="2" charset="0"/>
-                <a:cs typeface="CMU Serif Roman" panose="02000603000000000000" pitchFamily="2" charset="0"/>
-              </a:endParaRPr>
-            </a:p>
-          </p:txBody>
-        </p:sp>
-        <p:sp>
-          <p:nvSpPr>
             <p:cNvPr id="201" name="Oval 200">
               <a:extLst>
                 <a:ext uri="{FF2B5EF4-FFF2-40B4-BE49-F238E27FC236}">
@@ -7500,58 +7204,6 @@
         </p:sp>
         <p:sp>
           <p:nvSpPr>
-            <p:cNvPr id="202" name="TextBox 201">
-              <a:extLst>
-                <a:ext uri="{FF2B5EF4-FFF2-40B4-BE49-F238E27FC236}">
-                  <a16:creationId xmlns:a16="http://schemas.microsoft.com/office/drawing/2014/main" id="{745A73E4-66DA-634D-8AA5-2D5042350C9B}"/>
-                </a:ext>
-              </a:extLst>
-            </p:cNvPr>
-            <p:cNvSpPr txBox="1"/>
-            <p:nvPr/>
-          </p:nvSpPr>
-          <p:spPr>
-            <a:xfrm>
-              <a:off x="4007000" y="3470263"/>
-              <a:ext cx="383438" cy="400110"/>
-            </a:xfrm>
-            <a:prstGeom prst="rect">
-              <a:avLst/>
-            </a:prstGeom>
-            <a:noFill/>
-          </p:spPr>
-          <p:txBody>
-            <a:bodyPr wrap="none" rtlCol="0">
-              <a:spAutoFit/>
-            </a:bodyPr>
-            <a:lstStyle/>
-            <a:p>
-              <a:r>
-                <a:rPr lang="en-US" sz="2000" b="1">
-                  <a:latin typeface="CMU Serif Roman" panose="02000603000000000000" pitchFamily="2" charset="0"/>
-                  <a:ea typeface="CMU Serif Roman" panose="02000603000000000000" pitchFamily="2" charset="0"/>
-                  <a:cs typeface="CMU Serif Roman" panose="02000603000000000000" pitchFamily="2" charset="0"/>
-                </a:rPr>
-                <a:t>c</a:t>
-              </a:r>
-              <a:r>
-                <a:rPr lang="en-US" sz="2000" b="1" baseline="-25000">
-                  <a:latin typeface="CMU Serif Roman" panose="02000603000000000000" pitchFamily="2" charset="0"/>
-                  <a:ea typeface="CMU Serif Roman" panose="02000603000000000000" pitchFamily="2" charset="0"/>
-                  <a:cs typeface="CMU Serif Roman" panose="02000603000000000000" pitchFamily="2" charset="0"/>
-                </a:rPr>
-                <a:t>1</a:t>
-              </a:r>
-              <a:endParaRPr lang="en-US" sz="2000" b="1">
-                <a:latin typeface="CMU Serif Roman" panose="02000603000000000000" pitchFamily="2" charset="0"/>
-                <a:ea typeface="CMU Serif Roman" panose="02000603000000000000" pitchFamily="2" charset="0"/>
-                <a:cs typeface="CMU Serif Roman" panose="02000603000000000000" pitchFamily="2" charset="0"/>
-              </a:endParaRPr>
-            </a:p>
-          </p:txBody>
-        </p:sp>
-        <p:sp>
-          <p:nvSpPr>
             <p:cNvPr id="203" name="Oval 202">
               <a:extLst>
                 <a:ext uri="{FF2B5EF4-FFF2-40B4-BE49-F238E27FC236}">
@@ -7599,58 +7251,6 @@
             <a:p>
               <a:pPr algn="ctr"/>
               <a:endParaRPr lang="en-US">
-                <a:latin typeface="CMU Serif Roman" panose="02000603000000000000" pitchFamily="2" charset="0"/>
-                <a:ea typeface="CMU Serif Roman" panose="02000603000000000000" pitchFamily="2" charset="0"/>
-                <a:cs typeface="CMU Serif Roman" panose="02000603000000000000" pitchFamily="2" charset="0"/>
-              </a:endParaRPr>
-            </a:p>
-          </p:txBody>
-        </p:sp>
-        <p:sp>
-          <p:nvSpPr>
-            <p:cNvPr id="204" name="TextBox 203">
-              <a:extLst>
-                <a:ext uri="{FF2B5EF4-FFF2-40B4-BE49-F238E27FC236}">
-                  <a16:creationId xmlns:a16="http://schemas.microsoft.com/office/drawing/2014/main" id="{0DC4D89F-DC32-7640-95A2-BA99502E7488}"/>
-                </a:ext>
-              </a:extLst>
-            </p:cNvPr>
-            <p:cNvSpPr txBox="1"/>
-            <p:nvPr/>
-          </p:nvSpPr>
-          <p:spPr>
-            <a:xfrm>
-              <a:off x="4046756" y="4337382"/>
-              <a:ext cx="340158" cy="400110"/>
-            </a:xfrm>
-            <a:prstGeom prst="rect">
-              <a:avLst/>
-            </a:prstGeom>
-            <a:noFill/>
-          </p:spPr>
-          <p:txBody>
-            <a:bodyPr wrap="none" rtlCol="0">
-              <a:spAutoFit/>
-            </a:bodyPr>
-            <a:lstStyle/>
-            <a:p>
-              <a:r>
-                <a:rPr lang="en-US" sz="2000" b="1">
-                  <a:latin typeface="CMU Serif Roman" panose="02000603000000000000" pitchFamily="2" charset="0"/>
-                  <a:ea typeface="CMU Serif Roman" panose="02000603000000000000" pitchFamily="2" charset="0"/>
-                  <a:cs typeface="CMU Serif Roman" panose="02000603000000000000" pitchFamily="2" charset="0"/>
-                </a:rPr>
-                <a:t>i</a:t>
-              </a:r>
-              <a:r>
-                <a:rPr lang="en-US" sz="2000" b="1" baseline="-25000">
-                  <a:latin typeface="CMU Serif Roman" panose="02000603000000000000" pitchFamily="2" charset="0"/>
-                  <a:ea typeface="CMU Serif Roman" panose="02000603000000000000" pitchFamily="2" charset="0"/>
-                  <a:cs typeface="CMU Serif Roman" panose="02000603000000000000" pitchFamily="2" charset="0"/>
-                </a:rPr>
-                <a:t>1</a:t>
-              </a:r>
-              <a:endParaRPr lang="en-US" sz="2000" b="1">
                 <a:latin typeface="CMU Serif Roman" panose="02000603000000000000" pitchFamily="2" charset="0"/>
                 <a:ea typeface="CMU Serif Roman" panose="02000603000000000000" pitchFamily="2" charset="0"/>
                 <a:cs typeface="CMU Serif Roman" panose="02000603000000000000" pitchFamily="2" charset="0"/>
@@ -8090,58 +7690,6 @@
         </p:sp>
         <p:sp>
           <p:nvSpPr>
-            <p:cNvPr id="213" name="TextBox 212">
-              <a:extLst>
-                <a:ext uri="{FF2B5EF4-FFF2-40B4-BE49-F238E27FC236}">
-                  <a16:creationId xmlns:a16="http://schemas.microsoft.com/office/drawing/2014/main" id="{C621AB2C-E870-F343-B62A-88538B797323}"/>
-                </a:ext>
-              </a:extLst>
-            </p:cNvPr>
-            <p:cNvSpPr txBox="1"/>
-            <p:nvPr/>
-          </p:nvSpPr>
-          <p:spPr>
-            <a:xfrm>
-              <a:off x="5234250" y="4315034"/>
-              <a:ext cx="383438" cy="400110"/>
-            </a:xfrm>
-            <a:prstGeom prst="rect">
-              <a:avLst/>
-            </a:prstGeom>
-            <a:noFill/>
-          </p:spPr>
-          <p:txBody>
-            <a:bodyPr wrap="none" rtlCol="0">
-              <a:spAutoFit/>
-            </a:bodyPr>
-            <a:lstStyle/>
-            <a:p>
-              <a:r>
-                <a:rPr lang="en-US" sz="2000" b="1">
-                  <a:latin typeface="CMU Serif Roman" panose="02000603000000000000" pitchFamily="2" charset="0"/>
-                  <a:ea typeface="CMU Serif Roman" panose="02000603000000000000" pitchFamily="2" charset="0"/>
-                  <a:cs typeface="CMU Serif Roman" panose="02000603000000000000" pitchFamily="2" charset="0"/>
-                </a:rPr>
-                <a:t>c</a:t>
-              </a:r>
-              <a:r>
-                <a:rPr lang="en-US" sz="2000" b="1" baseline="-25000">
-                  <a:latin typeface="CMU Serif Roman" panose="02000603000000000000" pitchFamily="2" charset="0"/>
-                  <a:ea typeface="CMU Serif Roman" panose="02000603000000000000" pitchFamily="2" charset="0"/>
-                  <a:cs typeface="CMU Serif Roman" panose="02000603000000000000" pitchFamily="2" charset="0"/>
-                </a:rPr>
-                <a:t>2</a:t>
-              </a:r>
-              <a:endParaRPr lang="en-US" sz="2000" b="1">
-                <a:latin typeface="CMU Serif Roman" panose="02000603000000000000" pitchFamily="2" charset="0"/>
-                <a:ea typeface="CMU Serif Roman" panose="02000603000000000000" pitchFamily="2" charset="0"/>
-                <a:cs typeface="CMU Serif Roman" panose="02000603000000000000" pitchFamily="2" charset="0"/>
-              </a:endParaRPr>
-            </a:p>
-          </p:txBody>
-        </p:sp>
-        <p:sp>
-          <p:nvSpPr>
             <p:cNvPr id="214" name="Oval 213">
               <a:extLst>
                 <a:ext uri="{FF2B5EF4-FFF2-40B4-BE49-F238E27FC236}">
@@ -8189,58 +7737,6 @@
             <a:p>
               <a:pPr algn="ctr"/>
               <a:endParaRPr lang="en-US">
-                <a:latin typeface="CMU Serif Roman" panose="02000603000000000000" pitchFamily="2" charset="0"/>
-                <a:ea typeface="CMU Serif Roman" panose="02000603000000000000" pitchFamily="2" charset="0"/>
-                <a:cs typeface="CMU Serif Roman" panose="02000603000000000000" pitchFamily="2" charset="0"/>
-              </a:endParaRPr>
-            </a:p>
-          </p:txBody>
-        </p:sp>
-        <p:sp>
-          <p:nvSpPr>
-            <p:cNvPr id="215" name="TextBox 214">
-              <a:extLst>
-                <a:ext uri="{FF2B5EF4-FFF2-40B4-BE49-F238E27FC236}">
-                  <a16:creationId xmlns:a16="http://schemas.microsoft.com/office/drawing/2014/main" id="{3B40A67C-4F43-7340-B8F9-A5B708C8ED00}"/>
-                </a:ext>
-              </a:extLst>
-            </p:cNvPr>
-            <p:cNvSpPr txBox="1"/>
-            <p:nvPr/>
-          </p:nvSpPr>
-          <p:spPr>
-            <a:xfrm>
-              <a:off x="5268068" y="5182153"/>
-              <a:ext cx="340158" cy="400110"/>
-            </a:xfrm>
-            <a:prstGeom prst="rect">
-              <a:avLst/>
-            </a:prstGeom>
-            <a:noFill/>
-          </p:spPr>
-          <p:txBody>
-            <a:bodyPr wrap="none" rtlCol="0">
-              <a:spAutoFit/>
-            </a:bodyPr>
-            <a:lstStyle/>
-            <a:p>
-              <a:r>
-                <a:rPr lang="en-US" sz="2000" b="1">
-                  <a:latin typeface="CMU Serif Roman" panose="02000603000000000000" pitchFamily="2" charset="0"/>
-                  <a:ea typeface="CMU Serif Roman" panose="02000603000000000000" pitchFamily="2" charset="0"/>
-                  <a:cs typeface="CMU Serif Roman" panose="02000603000000000000" pitchFamily="2" charset="0"/>
-                </a:rPr>
-                <a:t>i</a:t>
-              </a:r>
-              <a:r>
-                <a:rPr lang="en-US" sz="2000" b="1" baseline="-25000">
-                  <a:latin typeface="CMU Serif Roman" panose="02000603000000000000" pitchFamily="2" charset="0"/>
-                  <a:ea typeface="CMU Serif Roman" panose="02000603000000000000" pitchFamily="2" charset="0"/>
-                  <a:cs typeface="CMU Serif Roman" panose="02000603000000000000" pitchFamily="2" charset="0"/>
-                </a:rPr>
-                <a:t>2</a:t>
-              </a:r>
-              <a:endParaRPr lang="en-US" sz="2000" b="1">
                 <a:latin typeface="CMU Serif Roman" panose="02000603000000000000" pitchFamily="2" charset="0"/>
                 <a:ea typeface="CMU Serif Roman" panose="02000603000000000000" pitchFamily="2" charset="0"/>
                 <a:cs typeface="CMU Serif Roman" panose="02000603000000000000" pitchFamily="2" charset="0"/>
@@ -8678,58 +8174,6 @@
         </p:sp>
         <p:sp>
           <p:nvSpPr>
-            <p:cNvPr id="224" name="TextBox 223">
-              <a:extLst>
-                <a:ext uri="{FF2B5EF4-FFF2-40B4-BE49-F238E27FC236}">
-                  <a16:creationId xmlns:a16="http://schemas.microsoft.com/office/drawing/2014/main" id="{11B21FFD-21C8-BF4E-A3E5-047B80E4F52C}"/>
-                </a:ext>
-              </a:extLst>
-            </p:cNvPr>
-            <p:cNvSpPr txBox="1"/>
-            <p:nvPr/>
-          </p:nvSpPr>
-          <p:spPr>
-            <a:xfrm>
-              <a:off x="4000819" y="5173842"/>
-              <a:ext cx="412292" cy="400110"/>
-            </a:xfrm>
-            <a:prstGeom prst="rect">
-              <a:avLst/>
-            </a:prstGeom>
-            <a:noFill/>
-          </p:spPr>
-          <p:txBody>
-            <a:bodyPr wrap="none" rtlCol="0">
-              <a:spAutoFit/>
-            </a:bodyPr>
-            <a:lstStyle/>
-            <a:p>
-              <a:r>
-                <a:rPr lang="en-US" sz="2000" b="1">
-                  <a:latin typeface="CMU Serif Roman" panose="02000603000000000000" pitchFamily="2" charset="0"/>
-                  <a:ea typeface="CMU Serif Roman" panose="02000603000000000000" pitchFamily="2" charset="0"/>
-                  <a:cs typeface="CMU Serif Roman" panose="02000603000000000000" pitchFamily="2" charset="0"/>
-                </a:rPr>
-                <a:t>d</a:t>
-              </a:r>
-              <a:r>
-                <a:rPr lang="en-US" sz="2000" b="1" baseline="-25000">
-                  <a:latin typeface="CMU Serif Roman" panose="02000603000000000000" pitchFamily="2" charset="0"/>
-                  <a:ea typeface="CMU Serif Roman" panose="02000603000000000000" pitchFamily="2" charset="0"/>
-                  <a:cs typeface="CMU Serif Roman" panose="02000603000000000000" pitchFamily="2" charset="0"/>
-                </a:rPr>
-                <a:t>2</a:t>
-              </a:r>
-              <a:endParaRPr lang="en-US" sz="2000" b="1">
-                <a:latin typeface="CMU Serif Roman" panose="02000603000000000000" pitchFamily="2" charset="0"/>
-                <a:ea typeface="CMU Serif Roman" panose="02000603000000000000" pitchFamily="2" charset="0"/>
-                <a:cs typeface="CMU Serif Roman" panose="02000603000000000000" pitchFamily="2" charset="0"/>
-              </a:endParaRPr>
-            </a:p>
-          </p:txBody>
-        </p:sp>
-        <p:sp>
-          <p:nvSpPr>
             <p:cNvPr id="225" name="Oval 224">
               <a:extLst>
                 <a:ext uri="{FF2B5EF4-FFF2-40B4-BE49-F238E27FC236}">
@@ -8781,61 +8225,6 @@
                 <a:ea typeface="CMU Serif Roman" panose="02000603000000000000" pitchFamily="2" charset="0"/>
                 <a:cs typeface="CMU Serif Roman" panose="02000603000000000000" pitchFamily="2" charset="0"/>
               </a:endParaRPr>
-            </a:p>
-          </p:txBody>
-        </p:sp>
-        <p:sp>
-          <p:nvSpPr>
-            <p:cNvPr id="226" name="TextBox 225">
-              <a:extLst>
-                <a:ext uri="{FF2B5EF4-FFF2-40B4-BE49-F238E27FC236}">
-                  <a16:creationId xmlns:a16="http://schemas.microsoft.com/office/drawing/2014/main" id="{CC85BABA-E34C-3B40-9603-D68944C4A268}"/>
-                </a:ext>
-              </a:extLst>
-            </p:cNvPr>
-            <p:cNvSpPr txBox="1"/>
-            <p:nvPr/>
-          </p:nvSpPr>
-          <p:spPr>
-            <a:xfrm>
-              <a:off x="6453270" y="5144394"/>
-              <a:ext cx="412292" cy="400110"/>
-            </a:xfrm>
-            <a:prstGeom prst="rect">
-              <a:avLst/>
-            </a:prstGeom>
-            <a:noFill/>
-          </p:spPr>
-          <p:txBody>
-            <a:bodyPr wrap="none" rtlCol="0">
-              <a:spAutoFit/>
-            </a:bodyPr>
-            <a:lstStyle/>
-            <a:p>
-              <a:r>
-                <a:rPr lang="en-US" sz="2000" b="1">
-                  <a:latin typeface="CMU Serif Roman" panose="02000603000000000000" pitchFamily="2" charset="0"/>
-                  <a:ea typeface="CMU Serif Roman" panose="02000603000000000000" pitchFamily="2" charset="0"/>
-                  <a:cs typeface="CMU Serif Roman" panose="02000603000000000000" pitchFamily="2" charset="0"/>
-                </a:rPr>
-                <a:t>i</a:t>
-              </a:r>
-              <a:r>
-                <a:rPr lang="en-US" sz="2000" b="1" baseline="-25000">
-                  <a:latin typeface="CMU Serif Roman" panose="02000603000000000000" pitchFamily="2" charset="0"/>
-                  <a:ea typeface="CMU Serif Roman" panose="02000603000000000000" pitchFamily="2" charset="0"/>
-                  <a:cs typeface="CMU Serif Roman" panose="02000603000000000000" pitchFamily="2" charset="0"/>
-                </a:rPr>
-                <a:t>2</a:t>
-              </a:r>
-              <a:r>
-                <a:rPr lang="en-US" sz="2000" b="1">
-                  <a:latin typeface="CMU Serif Roman" panose="02000603000000000000" pitchFamily="2" charset="0"/>
-                  <a:ea typeface="CMU Serif Roman" panose="02000603000000000000" pitchFamily="2" charset="0"/>
-                  <a:cs typeface="CMU Serif Roman" panose="02000603000000000000" pitchFamily="2" charset="0"/>
-                </a:rPr>
-                <a:t>’</a:t>
-              </a:r>
             </a:p>
           </p:txBody>
         </p:sp>
@@ -9325,10 +8714,10 @@
         </p:sp>
         <p:sp>
           <p:nvSpPr>
-            <p:cNvPr id="236" name="TextBox 235">
-              <a:extLst>
-                <a:ext uri="{FF2B5EF4-FFF2-40B4-BE49-F238E27FC236}">
-                  <a16:creationId xmlns:a16="http://schemas.microsoft.com/office/drawing/2014/main" id="{E4E2FC5C-2C20-EF43-8012-121CFFE062AA}"/>
+            <p:cNvPr id="237" name="TextBox 236">
+              <a:extLst>
+                <a:ext uri="{FF2B5EF4-FFF2-40B4-BE49-F238E27FC236}">
+                  <a16:creationId xmlns:a16="http://schemas.microsoft.com/office/drawing/2014/main" id="{153D7A6B-B15F-8046-85CE-6B81C446D630}"/>
                 </a:ext>
               </a:extLst>
             </p:cNvPr>
@@ -9337,8 +8726,8 @@
           </p:nvSpPr>
           <p:spPr>
             <a:xfrm>
-              <a:off x="6472935" y="6023739"/>
-              <a:ext cx="319318" cy="400110"/>
+              <a:off x="5742884" y="6197217"/>
+              <a:ext cx="644728" cy="276999"/>
             </a:xfrm>
             <a:prstGeom prst="rect">
               <a:avLst/>
@@ -9352,46 +8741,7 @@
             <a:lstStyle/>
             <a:p>
               <a:r>
-                <a:rPr lang="en-US" sz="2000" b="1">
-                  <a:latin typeface="CMU Serif Roman" panose="02000603000000000000" pitchFamily="2" charset="0"/>
-                  <a:ea typeface="CMU Serif Roman" panose="02000603000000000000" pitchFamily="2" charset="0"/>
-                  <a:cs typeface="CMU Serif Roman" panose="02000603000000000000" pitchFamily="2" charset="0"/>
-                </a:rPr>
-                <a:t>v</a:t>
-              </a:r>
-            </a:p>
-          </p:txBody>
-        </p:sp>
-        <p:sp>
-          <p:nvSpPr>
-            <p:cNvPr id="237" name="TextBox 236">
-              <a:extLst>
-                <a:ext uri="{FF2B5EF4-FFF2-40B4-BE49-F238E27FC236}">
-                  <a16:creationId xmlns:a16="http://schemas.microsoft.com/office/drawing/2014/main" id="{153D7A6B-B15F-8046-85CE-6B81C446D630}"/>
-                </a:ext>
-              </a:extLst>
-            </p:cNvPr>
-            <p:cNvSpPr txBox="1"/>
-            <p:nvPr/>
-          </p:nvSpPr>
-          <p:spPr>
-            <a:xfrm>
-              <a:off x="5742884" y="6197217"/>
-              <a:ext cx="607859" cy="261610"/>
-            </a:xfrm>
-            <a:prstGeom prst="rect">
-              <a:avLst/>
-            </a:prstGeom>
-            <a:noFill/>
-          </p:spPr>
-          <p:txBody>
-            <a:bodyPr wrap="none" rtlCol="0">
-              <a:spAutoFit/>
-            </a:bodyPr>
-            <a:lstStyle/>
-            <a:p>
-              <a:r>
-                <a:rPr lang="en-US" sz="1100">
+                <a:rPr lang="en-US" sz="1200">
                   <a:latin typeface="CMU Serif Roman" panose="02000603000000000000" pitchFamily="2" charset="0"/>
                   <a:ea typeface="CMU Serif Roman" panose="02000603000000000000" pitchFamily="2" charset="0"/>
                   <a:cs typeface="CMU Serif Roman" panose="02000603000000000000" pitchFamily="2" charset="0"/>
@@ -9504,61 +8854,6 @@
             </a:p>
           </p:txBody>
         </p:sp>
-        <p:sp>
-          <p:nvSpPr>
-            <p:cNvPr id="240" name="TextBox 239">
-              <a:extLst>
-                <a:ext uri="{FF2B5EF4-FFF2-40B4-BE49-F238E27FC236}">
-                  <a16:creationId xmlns:a16="http://schemas.microsoft.com/office/drawing/2014/main" id="{C5C60684-FEBB-DB43-8B8C-94DA84CF37A4}"/>
-                </a:ext>
-              </a:extLst>
-            </p:cNvPr>
-            <p:cNvSpPr txBox="1"/>
-            <p:nvPr/>
-          </p:nvSpPr>
-          <p:spPr>
-            <a:xfrm>
-              <a:off x="7652165" y="4287563"/>
-              <a:ext cx="412292" cy="400110"/>
-            </a:xfrm>
-            <a:prstGeom prst="rect">
-              <a:avLst/>
-            </a:prstGeom>
-            <a:noFill/>
-          </p:spPr>
-          <p:txBody>
-            <a:bodyPr wrap="none" rtlCol="0">
-              <a:spAutoFit/>
-            </a:bodyPr>
-            <a:lstStyle/>
-            <a:p>
-              <a:r>
-                <a:rPr lang="en-US" sz="2000" b="1">
-                  <a:latin typeface="CMU Serif Roman" panose="02000603000000000000" pitchFamily="2" charset="0"/>
-                  <a:ea typeface="CMU Serif Roman" panose="02000603000000000000" pitchFamily="2" charset="0"/>
-                  <a:cs typeface="CMU Serif Roman" panose="02000603000000000000" pitchFamily="2" charset="0"/>
-                </a:rPr>
-                <a:t>i</a:t>
-              </a:r>
-              <a:r>
-                <a:rPr lang="en-US" sz="2000" b="1" baseline="-25000">
-                  <a:latin typeface="CMU Serif Roman" panose="02000603000000000000" pitchFamily="2" charset="0"/>
-                  <a:ea typeface="CMU Serif Roman" panose="02000603000000000000" pitchFamily="2" charset="0"/>
-                  <a:cs typeface="CMU Serif Roman" panose="02000603000000000000" pitchFamily="2" charset="0"/>
-                </a:rPr>
-                <a:t>1</a:t>
-              </a:r>
-              <a:r>
-                <a:rPr lang="en-US" sz="2000" b="1">
-                  <a:latin typeface="CMU Serif Roman" panose="02000603000000000000" pitchFamily="2" charset="0"/>
-                  <a:ea typeface="CMU Serif Roman" panose="02000603000000000000" pitchFamily="2" charset="0"/>
-                  <a:cs typeface="CMU Serif Roman" panose="02000603000000000000" pitchFamily="2" charset="0"/>
-                </a:rPr>
-                <a:t>’</a:t>
-              </a:r>
-            </a:p>
-          </p:txBody>
-        </p:sp>
         <p:cxnSp>
           <p:nvCxnSpPr>
             <p:cNvPr id="241" name="Straight Connector 240">
@@ -9570,7 +8865,6 @@
             </p:cNvPr>
             <p:cNvCxnSpPr>
               <a:cxnSpLocks/>
-              <a:stCxn id="213" idx="3"/>
               <a:endCxn id="239" idx="2"/>
             </p:cNvCxnSpPr>
             <p:nvPr/>
@@ -9851,45 +9145,6 @@
         </p:sp>
         <p:sp>
           <p:nvSpPr>
-            <p:cNvPr id="246" name="TextBox 245">
-              <a:extLst>
-                <a:ext uri="{FF2B5EF4-FFF2-40B4-BE49-F238E27FC236}">
-                  <a16:creationId xmlns:a16="http://schemas.microsoft.com/office/drawing/2014/main" id="{3BEBA15E-72F4-444E-A3AC-149F35756619}"/>
-                </a:ext>
-              </a:extLst>
-            </p:cNvPr>
-            <p:cNvSpPr txBox="1"/>
-            <p:nvPr/>
-          </p:nvSpPr>
-          <p:spPr>
-            <a:xfrm>
-              <a:off x="8894636" y="3429995"/>
-              <a:ext cx="354584" cy="400110"/>
-            </a:xfrm>
-            <a:prstGeom prst="rect">
-              <a:avLst/>
-            </a:prstGeom>
-            <a:noFill/>
-          </p:spPr>
-          <p:txBody>
-            <a:bodyPr wrap="none" rtlCol="0">
-              <a:spAutoFit/>
-            </a:bodyPr>
-            <a:lstStyle/>
-            <a:p>
-              <a:r>
-                <a:rPr lang="en-US" sz="2000" b="1">
-                  <a:latin typeface="CMU Serif Roman" panose="02000603000000000000" pitchFamily="2" charset="0"/>
-                  <a:ea typeface="CMU Serif Roman" panose="02000603000000000000" pitchFamily="2" charset="0"/>
-                  <a:cs typeface="CMU Serif Roman" panose="02000603000000000000" pitchFamily="2" charset="0"/>
-                </a:rPr>
-                <a:t>s’</a:t>
-              </a:r>
-            </a:p>
-          </p:txBody>
-        </p:sp>
-        <p:sp>
-          <p:nvSpPr>
             <p:cNvPr id="247" name="Triangle 246">
               <a:extLst>
                 <a:ext uri="{FF2B5EF4-FFF2-40B4-BE49-F238E27FC236}">
@@ -10137,7 +9392,7 @@
           <p:spPr>
             <a:xfrm>
               <a:off x="2246761" y="3138034"/>
-              <a:ext cx="1367682" cy="307777"/>
+              <a:ext cx="1467068" cy="307777"/>
             </a:xfrm>
             <a:prstGeom prst="rect">
               <a:avLst/>
@@ -10156,7 +9411,7 @@
                   <a:ea typeface="CMU Serif Roman" panose="02000603000000000000" pitchFamily="2" charset="0"/>
                   <a:cs typeface="CMU Serif Roman" panose="02000603000000000000" pitchFamily="2" charset="0"/>
                 </a:rPr>
-                <a:t>[[[1,2],[3]], [[4]]]</a:t>
+                <a:t>[[[1, 2], [3]], [[4]]]</a:t>
               </a:r>
             </a:p>
           </p:txBody>
@@ -10176,7 +9431,7 @@
           <p:spPr>
             <a:xfrm>
               <a:off x="8265928" y="3136611"/>
-              <a:ext cx="1547218" cy="307777"/>
+              <a:ext cx="1646605" cy="307777"/>
             </a:xfrm>
             <a:prstGeom prst="rect">
               <a:avLst/>
@@ -10195,7 +9450,7 @@
                   <a:ea typeface="CMU Serif Roman" panose="02000603000000000000" pitchFamily="2" charset="0"/>
                   <a:cs typeface="CMU Serif Roman" panose="02000603000000000000" pitchFamily="2" charset="0"/>
                 </a:rPr>
-                <a:t>[[[100,2],[3]], [[4]]]</a:t>
+                <a:t>[[[100, 2], [3]], [[4]]]</a:t>
               </a:r>
             </a:p>
           </p:txBody>
@@ -10215,7 +9470,7 @@
           <p:spPr>
             <a:xfrm>
               <a:off x="3867662" y="4004190"/>
-              <a:ext cx="861133" cy="307777"/>
+              <a:ext cx="970137" cy="307777"/>
             </a:xfrm>
             <a:prstGeom prst="rect">
               <a:avLst/>
@@ -10234,7 +9489,7 @@
                   <a:ea typeface="CMU Serif Roman" panose="02000603000000000000" pitchFamily="2" charset="0"/>
                   <a:cs typeface="CMU Serif Roman" panose="02000603000000000000" pitchFamily="2" charset="0"/>
                 </a:rPr>
-                <a:t>[[1,2],[3]]</a:t>
+                <a:t>[[1, 2], [3]]</a:t>
               </a:r>
             </a:p>
           </p:txBody>
@@ -10253,8 +9508,8 @@
           </p:nvSpPr>
           <p:spPr>
             <a:xfrm>
-              <a:off x="3849587" y="3135349"/>
-              <a:ext cx="780983" cy="307777"/>
+              <a:off x="3824433" y="3135349"/>
+              <a:ext cx="859531" cy="307777"/>
             </a:xfrm>
             <a:prstGeom prst="rect">
               <a:avLst/>
@@ -10273,23 +9528,7 @@
                   <a:ea typeface="CMU Serif Roman" panose="02000603000000000000" pitchFamily="2" charset="0"/>
                   <a:cs typeface="CMU Serif Roman" panose="02000603000000000000" pitchFamily="2" charset="0"/>
                 </a:rPr>
-                <a:t>[d</a:t>
-              </a:r>
-              <a:r>
-                <a:rPr lang="en-US" sz="1400" baseline="-25000">
-                  <a:latin typeface="CMU Serif Roman" panose="02000603000000000000" pitchFamily="2" charset="0"/>
-                  <a:ea typeface="CMU Serif Roman" panose="02000603000000000000" pitchFamily="2" charset="0"/>
-                  <a:cs typeface="CMU Serif Roman" panose="02000603000000000000" pitchFamily="2" charset="0"/>
-                </a:rPr>
-                <a:t>1</a:t>
-              </a:r>
-              <a:r>
-                <a:rPr lang="en-US" sz="1400">
-                  <a:latin typeface="CMU Serif Roman" panose="02000603000000000000" pitchFamily="2" charset="0"/>
-                  <a:ea typeface="CMU Serif Roman" panose="02000603000000000000" pitchFamily="2" charset="0"/>
-                  <a:cs typeface="CMU Serif Roman" panose="02000603000000000000" pitchFamily="2" charset="0"/>
-                </a:rPr>
-                <a:t>,[[4]]]</a:t>
+                <a:t>[   , [[4]]]</a:t>
               </a:r>
             </a:p>
           </p:txBody>
@@ -10309,7 +9548,7 @@
           <p:spPr>
             <a:xfrm>
               <a:off x="5185720" y="4879658"/>
-              <a:ext cx="516488" cy="307777"/>
+              <a:ext cx="572593" cy="307777"/>
             </a:xfrm>
             <a:prstGeom prst="rect">
               <a:avLst/>
@@ -10328,7 +9567,7 @@
                   <a:ea typeface="CMU Serif Roman" panose="02000603000000000000" pitchFamily="2" charset="0"/>
                   <a:cs typeface="CMU Serif Roman" panose="02000603000000000000" pitchFamily="2" charset="0"/>
                 </a:rPr>
-                <a:t>[1,2]</a:t>
+                <a:t>[1, 2]</a:t>
               </a:r>
             </a:p>
           </p:txBody>
@@ -10347,8 +9586,8 @@
           </p:nvSpPr>
           <p:spPr>
             <a:xfrm>
-              <a:off x="6284582" y="4894029"/>
-              <a:ext cx="696024" cy="307777"/>
+              <a:off x="6222802" y="4894029"/>
+              <a:ext cx="752129" cy="307777"/>
             </a:xfrm>
             <a:prstGeom prst="rect">
               <a:avLst/>
@@ -10367,7 +9606,7 @@
                   <a:ea typeface="CMU Serif Roman" panose="02000603000000000000" pitchFamily="2" charset="0"/>
                   <a:cs typeface="CMU Serif Roman" panose="02000603000000000000" pitchFamily="2" charset="0"/>
                 </a:rPr>
-                <a:t>[100,2]</a:t>
+                <a:t>[100, 2]</a:t>
               </a:r>
             </a:p>
           </p:txBody>
@@ -10386,8 +9625,8 @@
           </p:nvSpPr>
           <p:spPr>
             <a:xfrm>
-              <a:off x="5176759" y="4009623"/>
-              <a:ext cx="681597" cy="307777"/>
+              <a:off x="5114494" y="4009623"/>
+              <a:ext cx="760144" cy="307777"/>
             </a:xfrm>
             <a:prstGeom prst="rect">
               <a:avLst/>
@@ -10406,145 +9645,27 @@
                   <a:ea typeface="CMU Serif Roman" panose="02000603000000000000" pitchFamily="2" charset="0"/>
                   <a:cs typeface="CMU Serif Roman" panose="02000603000000000000" pitchFamily="2" charset="0"/>
                 </a:rPr>
-                <a:t>[d</a:t>
-              </a:r>
-              <a:r>
-                <a:rPr lang="en-US" sz="1400" baseline="-25000">
-                  <a:latin typeface="CMU Serif Roman" panose="02000603000000000000" pitchFamily="2" charset="0"/>
-                  <a:ea typeface="CMU Serif Roman" panose="02000603000000000000" pitchFamily="2" charset="0"/>
-                  <a:cs typeface="CMU Serif Roman" panose="02000603000000000000" pitchFamily="2" charset="0"/>
-                </a:rPr>
-                <a:t>2</a:t>
-              </a:r>
-              <a:r>
-                <a:rPr lang="en-US" sz="1400">
-                  <a:latin typeface="CMU Serif Roman" panose="02000603000000000000" pitchFamily="2" charset="0"/>
-                  <a:ea typeface="CMU Serif Roman" panose="02000603000000000000" pitchFamily="2" charset="0"/>
-                  <a:cs typeface="CMU Serif Roman" panose="02000603000000000000" pitchFamily="2" charset="0"/>
-                </a:rPr>
-                <a:t>,[3]]</a:t>
+                <a:t>[   , [3]]</a:t>
               </a:r>
             </a:p>
           </p:txBody>
         </p:sp>
         <p:sp>
           <p:nvSpPr>
-            <p:cNvPr id="260" name="Rectangle 259">
-              <a:extLst>
-                <a:ext uri="{FF2B5EF4-FFF2-40B4-BE49-F238E27FC236}">
-                  <a16:creationId xmlns:a16="http://schemas.microsoft.com/office/drawing/2014/main" id="{BBE854FA-46F5-B64D-B0B6-7E58723D65F6}"/>
-                </a:ext>
-              </a:extLst>
-            </p:cNvPr>
-            <p:cNvSpPr/>
+            <p:cNvPr id="262" name="TextBox 261">
+              <a:extLst>
+                <a:ext uri="{FF2B5EF4-FFF2-40B4-BE49-F238E27FC236}">
+                  <a16:creationId xmlns:a16="http://schemas.microsoft.com/office/drawing/2014/main" id="{D75878D2-94FF-9747-8EA4-3B535AA3D941}"/>
+                </a:ext>
+              </a:extLst>
+            </p:cNvPr>
+            <p:cNvSpPr txBox="1"/>
             <p:nvPr/>
           </p:nvSpPr>
           <p:spPr>
             <a:xfrm>
-              <a:off x="2818041" y="4068442"/>
-              <a:ext cx="343364" cy="307777"/>
-            </a:xfrm>
-            <a:prstGeom prst="rect">
-              <a:avLst/>
-            </a:prstGeom>
-          </p:spPr>
-          <p:txBody>
-            <a:bodyPr wrap="none">
-              <a:spAutoFit/>
-            </a:bodyPr>
-            <a:lstStyle/>
-            <a:p>
-              <a:r>
-                <a:rPr lang="en-US" sz="1400">
-                  <a:latin typeface="CMU Serif Roman" panose="02000603000000000000" pitchFamily="2" charset="0"/>
-                  <a:ea typeface="CMU Serif Roman" panose="02000603000000000000" pitchFamily="2" charset="0"/>
-                  <a:cs typeface="CMU Serif Roman" panose="02000603000000000000" pitchFamily="2" charset="0"/>
-                </a:rPr>
-                <a:t>d</a:t>
-              </a:r>
-              <a:r>
-                <a:rPr lang="en-US" sz="1400" baseline="-25000">
-                  <a:latin typeface="CMU Serif Roman" panose="02000603000000000000" pitchFamily="2" charset="0"/>
-                  <a:ea typeface="CMU Serif Roman" panose="02000603000000000000" pitchFamily="2" charset="0"/>
-                  <a:cs typeface="CMU Serif Roman" panose="02000603000000000000" pitchFamily="2" charset="0"/>
-                </a:rPr>
-                <a:t>1</a:t>
-              </a:r>
-              <a:endParaRPr lang="en-US" sz="1400">
-                <a:latin typeface="CMU Serif Roman" panose="02000603000000000000" pitchFamily="2" charset="0"/>
-                <a:ea typeface="CMU Serif Roman" panose="02000603000000000000" pitchFamily="2" charset="0"/>
-                <a:cs typeface="CMU Serif Roman" panose="02000603000000000000" pitchFamily="2" charset="0"/>
-              </a:endParaRPr>
-            </a:p>
-          </p:txBody>
-        </p:sp>
-        <p:sp>
-          <p:nvSpPr>
-            <p:cNvPr id="261" name="Rectangle 260">
-              <a:extLst>
-                <a:ext uri="{FF2B5EF4-FFF2-40B4-BE49-F238E27FC236}">
-                  <a16:creationId xmlns:a16="http://schemas.microsoft.com/office/drawing/2014/main" id="{DD8BB122-E7B1-3249-9E53-418D2C56E580}"/>
-                </a:ext>
-              </a:extLst>
-            </p:cNvPr>
-            <p:cNvSpPr/>
-            <p:nvPr/>
-          </p:nvSpPr>
-          <p:spPr>
-            <a:xfrm>
-              <a:off x="4024319" y="4892191"/>
-              <a:ext cx="343364" cy="307777"/>
-            </a:xfrm>
-            <a:prstGeom prst="rect">
-              <a:avLst/>
-            </a:prstGeom>
-          </p:spPr>
-          <p:txBody>
-            <a:bodyPr wrap="none">
-              <a:spAutoFit/>
-            </a:bodyPr>
-            <a:lstStyle/>
-            <a:p>
-              <a:r>
-                <a:rPr lang="en-US" sz="1400">
-                  <a:latin typeface="CMU Serif Roman" panose="02000603000000000000" pitchFamily="2" charset="0"/>
-                  <a:ea typeface="CMU Serif Roman" panose="02000603000000000000" pitchFamily="2" charset="0"/>
-                  <a:cs typeface="CMU Serif Roman" panose="02000603000000000000" pitchFamily="2" charset="0"/>
-                </a:rPr>
-                <a:t>d</a:t>
-              </a:r>
-              <a:r>
-                <a:rPr lang="en-US" sz="1400" baseline="-25000">
-                  <a:latin typeface="CMU Serif Roman" panose="02000603000000000000" pitchFamily="2" charset="0"/>
-                  <a:ea typeface="CMU Serif Roman" panose="02000603000000000000" pitchFamily="2" charset="0"/>
-                  <a:cs typeface="CMU Serif Roman" panose="02000603000000000000" pitchFamily="2" charset="0"/>
-                </a:rPr>
-                <a:t>2</a:t>
-              </a:r>
-              <a:endParaRPr lang="en-US" sz="1400">
-                <a:latin typeface="CMU Serif Roman" panose="02000603000000000000" pitchFamily="2" charset="0"/>
-                <a:ea typeface="CMU Serif Roman" panose="02000603000000000000" pitchFamily="2" charset="0"/>
-                <a:cs typeface="CMU Serif Roman" panose="02000603000000000000" pitchFamily="2" charset="0"/>
-              </a:endParaRPr>
-            </a:p>
-          </p:txBody>
-        </p:sp>
-        <p:sp>
-          <p:nvSpPr>
-            <p:cNvPr id="262" name="TextBox 261">
-              <a:extLst>
-                <a:ext uri="{FF2B5EF4-FFF2-40B4-BE49-F238E27FC236}">
-                  <a16:creationId xmlns:a16="http://schemas.microsoft.com/office/drawing/2014/main" id="{D75878D2-94FF-9747-8EA4-3B535AA3D941}"/>
-                </a:ext>
-              </a:extLst>
-            </p:cNvPr>
-            <p:cNvSpPr txBox="1"/>
-            <p:nvPr/>
-          </p:nvSpPr>
-          <p:spPr>
-            <a:xfrm>
               <a:off x="7156503" y="3999406"/>
-              <a:ext cx="1040670" cy="307777"/>
+              <a:ext cx="1149674" cy="307777"/>
             </a:xfrm>
             <a:prstGeom prst="rect">
               <a:avLst/>
@@ -10563,11 +9684,491 @@
                   <a:ea typeface="CMU Serif Roman" panose="02000603000000000000" pitchFamily="2" charset="0"/>
                   <a:cs typeface="CMU Serif Roman" panose="02000603000000000000" pitchFamily="2" charset="0"/>
                 </a:rPr>
-                <a:t>[[100,2],[3]]</a:t>
+                <a:t>[[100, 2], [3]]</a:t>
               </a:r>
             </a:p>
           </p:txBody>
         </p:sp>
+        <p:pic>
+          <p:nvPicPr>
+            <p:cNvPr id="149" name="Picture 148">
+              <a:extLst>
+                <a:ext uri="{FF2B5EF4-FFF2-40B4-BE49-F238E27FC236}">
+                  <a16:creationId xmlns:a16="http://schemas.microsoft.com/office/drawing/2014/main" id="{AF283CB5-30B4-FD44-AE63-153FD5742E73}"/>
+                </a:ext>
+              </a:extLst>
+            </p:cNvPr>
+            <p:cNvPicPr>
+              <a:picLocks noChangeAspect="1"/>
+            </p:cNvPicPr>
+            <p:nvPr/>
+          </p:nvPicPr>
+          <p:blipFill>
+            <a:blip r:embed="rId3"/>
+            <a:stretch>
+              <a:fillRect/>
+            </a:stretch>
+          </p:blipFill>
+          <p:spPr>
+            <a:xfrm>
+              <a:off x="2887917" y="3627562"/>
+              <a:ext cx="153591" cy="154171"/>
+            </a:xfrm>
+            <a:prstGeom prst="rect">
+              <a:avLst/>
+            </a:prstGeom>
+          </p:spPr>
+        </p:pic>
+        <p:pic>
+          <p:nvPicPr>
+            <p:cNvPr id="156" name="Picture 155">
+              <a:extLst>
+                <a:ext uri="{FF2B5EF4-FFF2-40B4-BE49-F238E27FC236}">
+                  <a16:creationId xmlns:a16="http://schemas.microsoft.com/office/drawing/2014/main" id="{4B1D520C-4511-3143-90B9-11C83A448A07}"/>
+                </a:ext>
+              </a:extLst>
+            </p:cNvPr>
+            <p:cNvPicPr>
+              <a:picLocks noChangeAspect="1"/>
+            </p:cNvPicPr>
+            <p:nvPr/>
+          </p:nvPicPr>
+          <p:blipFill>
+            <a:blip r:embed="rId4"/>
+            <a:stretch>
+              <a:fillRect/>
+            </a:stretch>
+          </p:blipFill>
+          <p:spPr>
+            <a:xfrm>
+              <a:off x="8925867" y="3470263"/>
+              <a:ext cx="294907" cy="296020"/>
+            </a:xfrm>
+            <a:prstGeom prst="rect">
+              <a:avLst/>
+            </a:prstGeom>
+          </p:spPr>
+        </p:pic>
+        <p:pic>
+          <p:nvPicPr>
+            <p:cNvPr id="160" name="Picture 159">
+              <a:extLst>
+                <a:ext uri="{FF2B5EF4-FFF2-40B4-BE49-F238E27FC236}">
+                  <a16:creationId xmlns:a16="http://schemas.microsoft.com/office/drawing/2014/main" id="{EACD1B27-6A42-3842-9E22-3ADC11915D18}"/>
+                </a:ext>
+              </a:extLst>
+            </p:cNvPr>
+            <p:cNvPicPr>
+              <a:picLocks noChangeAspect="1"/>
+            </p:cNvPicPr>
+            <p:nvPr/>
+          </p:nvPicPr>
+          <p:blipFill>
+            <a:blip r:embed="rId5"/>
+            <a:stretch>
+              <a:fillRect/>
+            </a:stretch>
+          </p:blipFill>
+          <p:spPr>
+            <a:xfrm>
+              <a:off x="5301419" y="6057644"/>
+              <a:ext cx="300101" cy="301233"/>
+            </a:xfrm>
+            <a:prstGeom prst="rect">
+              <a:avLst/>
+            </a:prstGeom>
+          </p:spPr>
+        </p:pic>
+        <p:pic>
+          <p:nvPicPr>
+            <p:cNvPr id="164" name="Picture 163">
+              <a:extLst>
+                <a:ext uri="{FF2B5EF4-FFF2-40B4-BE49-F238E27FC236}">
+                  <a16:creationId xmlns:a16="http://schemas.microsoft.com/office/drawing/2014/main" id="{D0F08AA3-EEDA-CE48-85E6-171232B3E812}"/>
+                </a:ext>
+              </a:extLst>
+            </p:cNvPr>
+            <p:cNvPicPr>
+              <a:picLocks noChangeAspect="1"/>
+            </p:cNvPicPr>
+            <p:nvPr/>
+          </p:nvPicPr>
+          <p:blipFill>
+            <a:blip r:embed="rId6"/>
+            <a:stretch>
+              <a:fillRect/>
+            </a:stretch>
+          </p:blipFill>
+          <p:spPr>
+            <a:xfrm>
+              <a:off x="6491785" y="6073563"/>
+              <a:ext cx="317953" cy="319153"/>
+            </a:xfrm>
+            <a:prstGeom prst="rect">
+              <a:avLst/>
+            </a:prstGeom>
+          </p:spPr>
+        </p:pic>
+        <p:pic>
+          <p:nvPicPr>
+            <p:cNvPr id="167" name="Picture 166">
+              <a:extLst>
+                <a:ext uri="{FF2B5EF4-FFF2-40B4-BE49-F238E27FC236}">
+                  <a16:creationId xmlns:a16="http://schemas.microsoft.com/office/drawing/2014/main" id="{94FFFD74-7C91-3F4B-B252-F0FF0277534A}"/>
+                </a:ext>
+              </a:extLst>
+            </p:cNvPr>
+            <p:cNvPicPr>
+              <a:picLocks noChangeAspect="1"/>
+            </p:cNvPicPr>
+            <p:nvPr/>
+          </p:nvPicPr>
+          <p:blipFill>
+            <a:blip r:embed="rId7"/>
+            <a:stretch>
+              <a:fillRect/>
+            </a:stretch>
+          </p:blipFill>
+          <p:spPr>
+            <a:xfrm>
+              <a:off x="4061826" y="4411924"/>
+              <a:ext cx="272610" cy="273639"/>
+            </a:xfrm>
+            <a:prstGeom prst="rect">
+              <a:avLst/>
+            </a:prstGeom>
+          </p:spPr>
+        </p:pic>
+        <p:pic>
+          <p:nvPicPr>
+            <p:cNvPr id="170" name="Picture 169">
+              <a:extLst>
+                <a:ext uri="{FF2B5EF4-FFF2-40B4-BE49-F238E27FC236}">
+                  <a16:creationId xmlns:a16="http://schemas.microsoft.com/office/drawing/2014/main" id="{C2A5C5AA-2CBA-8745-9B62-410B801A285B}"/>
+                </a:ext>
+              </a:extLst>
+            </p:cNvPr>
+            <p:cNvPicPr>
+              <a:picLocks noChangeAspect="1"/>
+            </p:cNvPicPr>
+            <p:nvPr/>
+          </p:nvPicPr>
+          <p:blipFill>
+            <a:blip r:embed="rId8"/>
+            <a:stretch>
+              <a:fillRect/>
+            </a:stretch>
+          </p:blipFill>
+          <p:spPr>
+            <a:xfrm>
+              <a:off x="5307047" y="5241653"/>
+              <a:ext cx="265341" cy="266343"/>
+            </a:xfrm>
+            <a:prstGeom prst="rect">
+              <a:avLst/>
+            </a:prstGeom>
+          </p:spPr>
+        </p:pic>
+        <p:pic>
+          <p:nvPicPr>
+            <p:cNvPr id="22" name="Picture 21">
+              <a:extLst>
+                <a:ext uri="{FF2B5EF4-FFF2-40B4-BE49-F238E27FC236}">
+                  <a16:creationId xmlns:a16="http://schemas.microsoft.com/office/drawing/2014/main" id="{CA699831-0A18-E24C-B449-FD789FFFD2E8}"/>
+                </a:ext>
+              </a:extLst>
+            </p:cNvPr>
+            <p:cNvPicPr>
+              <a:picLocks noChangeAspect="1"/>
+            </p:cNvPicPr>
+            <p:nvPr/>
+          </p:nvPicPr>
+          <p:blipFill>
+            <a:blip r:embed="rId11"/>
+            <a:stretch>
+              <a:fillRect/>
+            </a:stretch>
+          </p:blipFill>
+          <p:spPr>
+            <a:xfrm>
+              <a:off x="2830513" y="4397021"/>
+              <a:ext cx="301538" cy="302570"/>
+            </a:xfrm>
+            <a:prstGeom prst="rect">
+              <a:avLst/>
+            </a:prstGeom>
+          </p:spPr>
+        </p:pic>
+        <p:pic>
+          <p:nvPicPr>
+            <p:cNvPr id="24" name="Picture 23">
+              <a:extLst>
+                <a:ext uri="{FF2B5EF4-FFF2-40B4-BE49-F238E27FC236}">
+                  <a16:creationId xmlns:a16="http://schemas.microsoft.com/office/drawing/2014/main" id="{9896B956-1331-2C41-AF76-82FF85B39DAD}"/>
+                </a:ext>
+              </a:extLst>
+            </p:cNvPr>
+            <p:cNvPicPr>
+              <a:picLocks noChangeAspect="1"/>
+            </p:cNvPicPr>
+            <p:nvPr/>
+          </p:nvPicPr>
+          <p:blipFill>
+            <a:blip r:embed="rId12"/>
+            <a:stretch>
+              <a:fillRect/>
+            </a:stretch>
+          </p:blipFill>
+          <p:spPr>
+            <a:xfrm>
+              <a:off x="4047125" y="5247630"/>
+              <a:ext cx="290960" cy="291957"/>
+            </a:xfrm>
+            <a:prstGeom prst="rect">
+              <a:avLst/>
+            </a:prstGeom>
+          </p:spPr>
+        </p:pic>
+        <p:pic>
+          <p:nvPicPr>
+            <p:cNvPr id="177" name="Picture 176">
+              <a:extLst>
+                <a:ext uri="{FF2B5EF4-FFF2-40B4-BE49-F238E27FC236}">
+                  <a16:creationId xmlns:a16="http://schemas.microsoft.com/office/drawing/2014/main" id="{F9E21ECD-B140-D048-96B2-82C59B468F51}"/>
+                </a:ext>
+              </a:extLst>
+            </p:cNvPr>
+            <p:cNvPicPr>
+              <a:picLocks noChangeAspect="1"/>
+            </p:cNvPicPr>
+            <p:nvPr/>
+          </p:nvPicPr>
+          <p:blipFill>
+            <a:blip r:embed="rId9"/>
+            <a:stretch>
+              <a:fillRect/>
+            </a:stretch>
+          </p:blipFill>
+          <p:spPr>
+            <a:xfrm>
+              <a:off x="7707242" y="4366924"/>
+              <a:ext cx="283126" cy="284095"/>
+            </a:xfrm>
+            <a:prstGeom prst="rect">
+              <a:avLst/>
+            </a:prstGeom>
+          </p:spPr>
+        </p:pic>
+        <p:pic>
+          <p:nvPicPr>
+            <p:cNvPr id="180" name="Picture 179">
+              <a:extLst>
+                <a:ext uri="{FF2B5EF4-FFF2-40B4-BE49-F238E27FC236}">
+                  <a16:creationId xmlns:a16="http://schemas.microsoft.com/office/drawing/2014/main" id="{B19DE4BB-2124-E04D-A4A1-64BC8958A119}"/>
+                </a:ext>
+              </a:extLst>
+            </p:cNvPr>
+            <p:cNvPicPr>
+              <a:picLocks noChangeAspect="1"/>
+            </p:cNvPicPr>
+            <p:nvPr/>
+          </p:nvPicPr>
+          <p:blipFill>
+            <a:blip r:embed="rId10"/>
+            <a:stretch>
+              <a:fillRect/>
+            </a:stretch>
+          </p:blipFill>
+          <p:spPr>
+            <a:xfrm>
+              <a:off x="6508667" y="5224865"/>
+              <a:ext cx="271239" cy="272168"/>
+            </a:xfrm>
+            <a:prstGeom prst="rect">
+              <a:avLst/>
+            </a:prstGeom>
+          </p:spPr>
+        </p:pic>
+        <p:pic>
+          <p:nvPicPr>
+            <p:cNvPr id="30" name="Picture 29">
+              <a:extLst>
+                <a:ext uri="{FF2B5EF4-FFF2-40B4-BE49-F238E27FC236}">
+                  <a16:creationId xmlns:a16="http://schemas.microsoft.com/office/drawing/2014/main" id="{51639052-C2E3-394C-AFE9-E292F9B94D23}"/>
+                </a:ext>
+              </a:extLst>
+            </p:cNvPr>
+            <p:cNvPicPr>
+              <a:picLocks noChangeAspect="1"/>
+            </p:cNvPicPr>
+            <p:nvPr/>
+          </p:nvPicPr>
+          <p:blipFill>
+            <a:blip r:embed="rId13"/>
+            <a:stretch>
+              <a:fillRect/>
+            </a:stretch>
+          </p:blipFill>
+          <p:spPr>
+            <a:xfrm>
+              <a:off x="4056516" y="3568866"/>
+              <a:ext cx="270935" cy="271957"/>
+            </a:xfrm>
+            <a:prstGeom prst="rect">
+              <a:avLst/>
+            </a:prstGeom>
+          </p:spPr>
+        </p:pic>
+        <p:pic>
+          <p:nvPicPr>
+            <p:cNvPr id="32" name="Picture 31">
+              <a:extLst>
+                <a:ext uri="{FF2B5EF4-FFF2-40B4-BE49-F238E27FC236}">
+                  <a16:creationId xmlns:a16="http://schemas.microsoft.com/office/drawing/2014/main" id="{F3AA445C-2F9F-DB42-96DE-C5D5B1880651}"/>
+                </a:ext>
+              </a:extLst>
+            </p:cNvPr>
+            <p:cNvPicPr>
+              <a:picLocks noChangeAspect="1"/>
+            </p:cNvPicPr>
+            <p:nvPr/>
+          </p:nvPicPr>
+          <p:blipFill>
+            <a:blip r:embed="rId14"/>
+            <a:stretch>
+              <a:fillRect/>
+            </a:stretch>
+          </p:blipFill>
+          <p:spPr>
+            <a:xfrm>
+              <a:off x="5297808" y="4404775"/>
+              <a:ext cx="273651" cy="274683"/>
+            </a:xfrm>
+            <a:prstGeom prst="rect">
+              <a:avLst/>
+            </a:prstGeom>
+          </p:spPr>
+        </p:pic>
+        <p:pic>
+          <p:nvPicPr>
+            <p:cNvPr id="185" name="Picture 184">
+              <a:extLst>
+                <a:ext uri="{FF2B5EF4-FFF2-40B4-BE49-F238E27FC236}">
+                  <a16:creationId xmlns:a16="http://schemas.microsoft.com/office/drawing/2014/main" id="{C27F6243-9107-964B-AAAC-8BE72606828A}"/>
+                </a:ext>
+              </a:extLst>
+            </p:cNvPr>
+            <p:cNvPicPr>
+              <a:picLocks noChangeAspect="1"/>
+            </p:cNvPicPr>
+            <p:nvPr/>
+          </p:nvPicPr>
+          <p:blipFill>
+            <a:blip r:embed="rId11"/>
+            <a:stretch>
+              <a:fillRect/>
+            </a:stretch>
+          </p:blipFill>
+          <p:spPr>
+            <a:xfrm>
+              <a:off x="2887000" y="4120737"/>
+              <a:ext cx="209134" cy="209850"/>
+            </a:xfrm>
+            <a:prstGeom prst="rect">
+              <a:avLst/>
+            </a:prstGeom>
+          </p:spPr>
+        </p:pic>
+        <p:pic>
+          <p:nvPicPr>
+            <p:cNvPr id="186" name="Picture 185">
+              <a:extLst>
+                <a:ext uri="{FF2B5EF4-FFF2-40B4-BE49-F238E27FC236}">
+                  <a16:creationId xmlns:a16="http://schemas.microsoft.com/office/drawing/2014/main" id="{EDE59E64-F40A-7C45-A78A-005C078E5CED}"/>
+                </a:ext>
+              </a:extLst>
+            </p:cNvPr>
+            <p:cNvPicPr>
+              <a:picLocks noChangeAspect="1"/>
+            </p:cNvPicPr>
+            <p:nvPr/>
+          </p:nvPicPr>
+          <p:blipFill>
+            <a:blip r:embed="rId11"/>
+            <a:stretch>
+              <a:fillRect/>
+            </a:stretch>
+          </p:blipFill>
+          <p:spPr>
+            <a:xfrm>
+              <a:off x="3956044" y="3201248"/>
+              <a:ext cx="209134" cy="209850"/>
+            </a:xfrm>
+            <a:prstGeom prst="rect">
+              <a:avLst/>
+            </a:prstGeom>
+          </p:spPr>
+        </p:pic>
+        <p:pic>
+          <p:nvPicPr>
+            <p:cNvPr id="187" name="Picture 186">
+              <a:extLst>
+                <a:ext uri="{FF2B5EF4-FFF2-40B4-BE49-F238E27FC236}">
+                  <a16:creationId xmlns:a16="http://schemas.microsoft.com/office/drawing/2014/main" id="{8A8D5548-34D4-1A4D-BE33-C0EF99666E1C}"/>
+                </a:ext>
+              </a:extLst>
+            </p:cNvPr>
+            <p:cNvPicPr>
+              <a:picLocks noChangeAspect="1"/>
+            </p:cNvPicPr>
+            <p:nvPr/>
+          </p:nvPicPr>
+          <p:blipFill>
+            <a:blip r:embed="rId12"/>
+            <a:stretch>
+              <a:fillRect/>
+            </a:stretch>
+          </p:blipFill>
+          <p:spPr>
+            <a:xfrm>
+              <a:off x="4092664" y="4964132"/>
+              <a:ext cx="197856" cy="198534"/>
+            </a:xfrm>
+            <a:prstGeom prst="rect">
+              <a:avLst/>
+            </a:prstGeom>
+          </p:spPr>
+        </p:pic>
+        <p:pic>
+          <p:nvPicPr>
+            <p:cNvPr id="188" name="Picture 187">
+              <a:extLst>
+                <a:ext uri="{FF2B5EF4-FFF2-40B4-BE49-F238E27FC236}">
+                  <a16:creationId xmlns:a16="http://schemas.microsoft.com/office/drawing/2014/main" id="{B021974E-B330-F145-88BC-6157F232541D}"/>
+                </a:ext>
+              </a:extLst>
+            </p:cNvPr>
+            <p:cNvPicPr>
+              <a:picLocks noChangeAspect="1"/>
+            </p:cNvPicPr>
+            <p:nvPr/>
+          </p:nvPicPr>
+          <p:blipFill>
+            <a:blip r:embed="rId12"/>
+            <a:stretch>
+              <a:fillRect/>
+            </a:stretch>
+          </p:blipFill>
+          <p:spPr>
+            <a:xfrm>
+              <a:off x="5244738" y="4086074"/>
+              <a:ext cx="197856" cy="198534"/>
+            </a:xfrm>
+            <a:prstGeom prst="rect">
+              <a:avLst/>
+            </a:prstGeom>
+          </p:spPr>
+        </p:pic>
       </p:grpSp>
     </p:spTree>
     <p:extLst>

</xml_diff>